<commit_message>
F03: started filling time table,  G01: finished, PSP: created technical planning phase
</commit_message>
<xml_diff>
--- a/Documents/projectstructureplan.pptx
+++ b/Documents/projectstructureplan.pptx
@@ -262,7 +262,7 @@
           <a:p>
             <a:fld id="{1FD5B0D3-95BA-406C-B500-C3B45FB0BF63}" type="datetimeFigureOut">
               <a:rPr lang="de-AT" smtClean="0"/>
-              <a:t>09.01.2020</a:t>
+              <a:t>16.01.2020</a:t>
             </a:fld>
             <a:endParaRPr lang="de-AT"/>
           </a:p>
@@ -462,7 +462,7 @@
           <a:p>
             <a:fld id="{1FD5B0D3-95BA-406C-B500-C3B45FB0BF63}" type="datetimeFigureOut">
               <a:rPr lang="de-AT" smtClean="0"/>
-              <a:t>09.01.2020</a:t>
+              <a:t>16.01.2020</a:t>
             </a:fld>
             <a:endParaRPr lang="de-AT"/>
           </a:p>
@@ -672,7 +672,7 @@
           <a:p>
             <a:fld id="{1FD5B0D3-95BA-406C-B500-C3B45FB0BF63}" type="datetimeFigureOut">
               <a:rPr lang="de-AT" smtClean="0"/>
-              <a:t>09.01.2020</a:t>
+              <a:t>16.01.2020</a:t>
             </a:fld>
             <a:endParaRPr lang="de-AT"/>
           </a:p>
@@ -872,7 +872,7 @@
           <a:p>
             <a:fld id="{1FD5B0D3-95BA-406C-B500-C3B45FB0BF63}" type="datetimeFigureOut">
               <a:rPr lang="de-AT" smtClean="0"/>
-              <a:t>09.01.2020</a:t>
+              <a:t>16.01.2020</a:t>
             </a:fld>
             <a:endParaRPr lang="de-AT"/>
           </a:p>
@@ -1148,7 +1148,7 @@
           <a:p>
             <a:fld id="{1FD5B0D3-95BA-406C-B500-C3B45FB0BF63}" type="datetimeFigureOut">
               <a:rPr lang="de-AT" smtClean="0"/>
-              <a:t>09.01.2020</a:t>
+              <a:t>16.01.2020</a:t>
             </a:fld>
             <a:endParaRPr lang="de-AT"/>
           </a:p>
@@ -1416,7 +1416,7 @@
           <a:p>
             <a:fld id="{1FD5B0D3-95BA-406C-B500-C3B45FB0BF63}" type="datetimeFigureOut">
               <a:rPr lang="de-AT" smtClean="0"/>
-              <a:t>09.01.2020</a:t>
+              <a:t>16.01.2020</a:t>
             </a:fld>
             <a:endParaRPr lang="de-AT"/>
           </a:p>
@@ -1831,7 +1831,7 @@
           <a:p>
             <a:fld id="{1FD5B0D3-95BA-406C-B500-C3B45FB0BF63}" type="datetimeFigureOut">
               <a:rPr lang="de-AT" smtClean="0"/>
-              <a:t>09.01.2020</a:t>
+              <a:t>16.01.2020</a:t>
             </a:fld>
             <a:endParaRPr lang="de-AT"/>
           </a:p>
@@ -1973,7 +1973,7 @@
           <a:p>
             <a:fld id="{1FD5B0D3-95BA-406C-B500-C3B45FB0BF63}" type="datetimeFigureOut">
               <a:rPr lang="de-AT" smtClean="0"/>
-              <a:t>09.01.2020</a:t>
+              <a:t>16.01.2020</a:t>
             </a:fld>
             <a:endParaRPr lang="de-AT"/>
           </a:p>
@@ -2086,7 +2086,7 @@
           <a:p>
             <a:fld id="{1FD5B0D3-95BA-406C-B500-C3B45FB0BF63}" type="datetimeFigureOut">
               <a:rPr lang="de-AT" smtClean="0"/>
-              <a:t>09.01.2020</a:t>
+              <a:t>16.01.2020</a:t>
             </a:fld>
             <a:endParaRPr lang="de-AT"/>
           </a:p>
@@ -2399,7 +2399,7 @@
           <a:p>
             <a:fld id="{1FD5B0D3-95BA-406C-B500-C3B45FB0BF63}" type="datetimeFigureOut">
               <a:rPr lang="de-AT" smtClean="0"/>
-              <a:t>09.01.2020</a:t>
+              <a:t>16.01.2020</a:t>
             </a:fld>
             <a:endParaRPr lang="de-AT"/>
           </a:p>
@@ -2688,7 +2688,7 @@
           <a:p>
             <a:fld id="{1FD5B0D3-95BA-406C-B500-C3B45FB0BF63}" type="datetimeFigureOut">
               <a:rPr lang="de-AT" smtClean="0"/>
-              <a:t>09.01.2020</a:t>
+              <a:t>16.01.2020</a:t>
             </a:fld>
             <a:endParaRPr lang="de-AT"/>
           </a:p>
@@ -2931,7 +2931,7 @@
           <a:p>
             <a:fld id="{1FD5B0D3-95BA-406C-B500-C3B45FB0BF63}" type="datetimeFigureOut">
               <a:rPr lang="de-AT" smtClean="0"/>
-              <a:t>09.01.2020</a:t>
+              <a:t>16.01.2020</a:t>
             </a:fld>
             <a:endParaRPr lang="de-AT"/>
           </a:p>
@@ -3348,75 +3348,6 @@
           <a:chExt cx="0" cy="0"/>
         </a:xfrm>
       </p:grpSpPr>
-      <p:sp>
-        <p:nvSpPr>
-          <p:cNvPr id="4" name="Rechteck 3">
-            <a:extLst>
-              <a:ext uri="{FF2B5EF4-FFF2-40B4-BE49-F238E27FC236}">
-                <a16:creationId xmlns:a16="http://schemas.microsoft.com/office/drawing/2014/main" id="{5297410D-73A7-48D4-AB12-E7B85B2F2F8A}"/>
-              </a:ext>
-            </a:extLst>
-          </p:cNvPr>
-          <p:cNvSpPr/>
-          <p:nvPr/>
-        </p:nvSpPr>
-        <p:spPr>
-          <a:xfrm>
-            <a:off x="4495800" y="158045"/>
-            <a:ext cx="3200400" cy="530950"/>
-          </a:xfrm>
-          <a:prstGeom prst="rect">
-            <a:avLst/>
-          </a:prstGeom>
-          <a:solidFill>
-            <a:schemeClr val="bg1"/>
-          </a:solidFill>
-          <a:ln>
-            <a:solidFill>
-              <a:schemeClr val="tx1"/>
-            </a:solidFill>
-          </a:ln>
-        </p:spPr>
-        <p:style>
-          <a:lnRef idx="2">
-            <a:schemeClr val="accent1">
-              <a:shade val="50000"/>
-            </a:schemeClr>
-          </a:lnRef>
-          <a:fillRef idx="1">
-            <a:schemeClr val="accent1"/>
-          </a:fillRef>
-          <a:effectRef idx="0">
-            <a:schemeClr val="accent1"/>
-          </a:effectRef>
-          <a:fontRef idx="minor">
-            <a:schemeClr val="lt1"/>
-          </a:fontRef>
-        </p:style>
-        <p:txBody>
-          <a:bodyPr rtlCol="0" anchor="ctr"/>
-          <a:lstStyle/>
-          <a:p>
-            <a:pPr algn="ctr"/>
-            <a:r>
-              <a:rPr lang="de-AT" sz="2000" b="1" dirty="0" err="1">
-                <a:solidFill>
-                  <a:schemeClr val="tx1"/>
-                </a:solidFill>
-              </a:rPr>
-              <a:t>Projectstructureplan</a:t>
-            </a:r>
-            <a:r>
-              <a:rPr lang="de-AT" sz="2000" b="1" dirty="0">
-                <a:solidFill>
-                  <a:schemeClr val="tx1"/>
-                </a:solidFill>
-              </a:rPr>
-              <a:t> (PSP)</a:t>
-            </a:r>
-          </a:p>
-        </p:txBody>
-      </p:sp>
       <p:grpSp>
         <p:nvGrpSpPr>
           <p:cNvPr id="23" name="Gruppieren 22">
@@ -3797,20 +3728,12 @@
             <a:p>
               <a:pPr algn="ctr"/>
               <a:r>
-                <a:rPr lang="de-AT" sz="1600" dirty="0" err="1">
-                  <a:solidFill>
-                    <a:schemeClr val="tx1"/>
-                  </a:solidFill>
-                </a:rPr>
-                <a:t>Creating</a:t>
-              </a:r>
-              <a:r>
                 <a:rPr lang="de-AT" sz="1600" dirty="0">
                   <a:solidFill>
                     <a:schemeClr val="tx1"/>
                   </a:solidFill>
                 </a:rPr>
-                <a:t> G01</a:t>
+                <a:t>Create G01</a:t>
               </a:r>
             </a:p>
           </p:txBody>
@@ -4101,20 +4024,12 @@
             <a:p>
               <a:pPr algn="ctr"/>
               <a:r>
-                <a:rPr lang="de-AT" sz="1600" dirty="0" err="1">
-                  <a:solidFill>
-                    <a:schemeClr val="tx1"/>
-                  </a:solidFill>
-                </a:rPr>
-                <a:t>Creating</a:t>
-              </a:r>
-              <a:r>
                 <a:rPr lang="de-AT" sz="1600" dirty="0">
                   <a:solidFill>
                     <a:schemeClr val="tx1"/>
                   </a:solidFill>
                 </a:rPr>
-                <a:t> G02</a:t>
+                <a:t>Create G02</a:t>
               </a:r>
             </a:p>
           </p:txBody>
@@ -4405,20 +4320,12 @@
             <a:p>
               <a:pPr algn="ctr"/>
               <a:r>
-                <a:rPr lang="de-AT" sz="1600" dirty="0" err="1">
-                  <a:solidFill>
-                    <a:schemeClr val="tx1"/>
-                  </a:solidFill>
-                </a:rPr>
-                <a:t>Creating</a:t>
-              </a:r>
-              <a:r>
                 <a:rPr lang="de-AT" sz="1600" dirty="0">
                   <a:solidFill>
                     <a:schemeClr val="tx1"/>
                   </a:solidFill>
                 </a:rPr>
-                <a:t> G03</a:t>
+                <a:t>Create G03</a:t>
               </a:r>
             </a:p>
           </p:txBody>
@@ -4709,20 +4616,12 @@
             <a:p>
               <a:pPr algn="ctr"/>
               <a:r>
-                <a:rPr lang="de-AT" sz="1600" dirty="0" err="1">
-                  <a:solidFill>
-                    <a:schemeClr val="tx1"/>
-                  </a:solidFill>
-                </a:rPr>
-                <a:t>Creating</a:t>
-              </a:r>
-              <a:r>
                 <a:rPr lang="de-AT" sz="1600" dirty="0">
                   <a:solidFill>
                     <a:schemeClr val="tx1"/>
                   </a:solidFill>
                 </a:rPr>
-                <a:t> G05</a:t>
+                <a:t>Create G05</a:t>
               </a:r>
             </a:p>
           </p:txBody>
@@ -5528,7 +5427,7 @@
               </a:r>
               <a:r>
                 <a:rPr lang="de-AT" sz="1200" dirty="0" err="1"/>
-                <a:t>planning</a:t>
+                <a:t>Planning</a:t>
               </a:r>
               <a:endParaRPr lang="de-AT" sz="1200" dirty="0"/>
             </a:p>
@@ -5931,20 +5830,12 @@
             <a:p>
               <a:pPr algn="ctr"/>
               <a:r>
-                <a:rPr lang="de-AT" sz="1600" dirty="0" err="1">
-                  <a:solidFill>
-                    <a:schemeClr val="tx1"/>
-                  </a:solidFill>
-                </a:rPr>
-                <a:t>Creating</a:t>
-              </a:r>
-              <a:r>
                 <a:rPr lang="de-AT" sz="1600" dirty="0">
                   <a:solidFill>
                     <a:schemeClr val="tx1"/>
                   </a:solidFill>
                 </a:rPr>
-                <a:t> F01</a:t>
+                <a:t>Create F01</a:t>
               </a:r>
             </a:p>
           </p:txBody>
@@ -6235,20 +6126,12 @@
             <a:p>
               <a:pPr algn="ctr"/>
               <a:r>
-                <a:rPr lang="de-AT" sz="1600" dirty="0" err="1">
-                  <a:solidFill>
-                    <a:schemeClr val="tx1"/>
-                  </a:solidFill>
-                </a:rPr>
-                <a:t>Creating</a:t>
-              </a:r>
-              <a:r>
                 <a:rPr lang="de-AT" sz="1600" dirty="0">
                   <a:solidFill>
                     <a:schemeClr val="tx1"/>
                   </a:solidFill>
                 </a:rPr>
-                <a:t> F02</a:t>
+                <a:t>Create F02</a:t>
               </a:r>
             </a:p>
           </p:txBody>
@@ -6539,20 +6422,12 @@
             <a:p>
               <a:pPr algn="ctr"/>
               <a:r>
-                <a:rPr lang="de-AT" sz="1600" dirty="0" err="1">
-                  <a:solidFill>
-                    <a:schemeClr val="tx1"/>
-                  </a:solidFill>
-                </a:rPr>
-                <a:t>Creating</a:t>
-              </a:r>
-              <a:r>
                 <a:rPr lang="de-AT" sz="1600" dirty="0">
                   <a:solidFill>
                     <a:schemeClr val="tx1"/>
                   </a:solidFill>
                 </a:rPr>
-                <a:t> F03</a:t>
+                <a:t>Create F03</a:t>
               </a:r>
             </a:p>
           </p:txBody>
@@ -6848,7 +6723,7 @@
                     <a:schemeClr val="tx1"/>
                   </a:solidFill>
                 </a:rPr>
-                <a:t>update G01</a:t>
+                <a:t>Update G01</a:t>
               </a:r>
             </a:p>
           </p:txBody>
@@ -9191,6 +9066,2947 @@
           </p:cxnSp>
         </p:grpSp>
       </p:grpSp>
+      <p:sp>
+        <p:nvSpPr>
+          <p:cNvPr id="2" name="Textfeld 1">
+            <a:extLst>
+              <a:ext uri="{FF2B5EF4-FFF2-40B4-BE49-F238E27FC236}">
+                <a16:creationId xmlns:a16="http://schemas.microsoft.com/office/drawing/2014/main" id="{2A845882-8B52-413C-A4FE-D1B510DBDAD1}"/>
+              </a:ext>
+            </a:extLst>
+          </p:cNvPr>
+          <p:cNvSpPr txBox="1"/>
+          <p:nvPr/>
+        </p:nvSpPr>
+        <p:spPr>
+          <a:xfrm>
+            <a:off x="142441" y="777044"/>
+            <a:ext cx="359394" cy="369332"/>
+          </a:xfrm>
+          <a:prstGeom prst="rect">
+            <a:avLst/>
+          </a:prstGeom>
+          <a:noFill/>
+        </p:spPr>
+        <p:txBody>
+          <a:bodyPr wrap="none" rtlCol="0">
+            <a:spAutoFit/>
+          </a:bodyPr>
+          <a:lstStyle/>
+          <a:p>
+            <a:r>
+              <a:rPr lang="de-AT" dirty="0"/>
+              <a:t>1.</a:t>
+            </a:r>
+          </a:p>
+        </p:txBody>
+      </p:sp>
+      <p:sp>
+        <p:nvSpPr>
+          <p:cNvPr id="180" name="Textfeld 179">
+            <a:extLst>
+              <a:ext uri="{FF2B5EF4-FFF2-40B4-BE49-F238E27FC236}">
+                <a16:creationId xmlns:a16="http://schemas.microsoft.com/office/drawing/2014/main" id="{DC2759F0-D4CF-498D-A358-BDA2F5B4F282}"/>
+              </a:ext>
+            </a:extLst>
+          </p:cNvPr>
+          <p:cNvSpPr txBox="1"/>
+          <p:nvPr/>
+        </p:nvSpPr>
+        <p:spPr>
+          <a:xfrm>
+            <a:off x="1876205" y="792269"/>
+            <a:ext cx="359394" cy="369332"/>
+          </a:xfrm>
+          <a:prstGeom prst="rect">
+            <a:avLst/>
+          </a:prstGeom>
+          <a:noFill/>
+        </p:spPr>
+        <p:txBody>
+          <a:bodyPr wrap="none" rtlCol="0">
+            <a:spAutoFit/>
+          </a:bodyPr>
+          <a:lstStyle/>
+          <a:p>
+            <a:r>
+              <a:rPr lang="de-AT" dirty="0"/>
+              <a:t>2.</a:t>
+            </a:r>
+          </a:p>
+        </p:txBody>
+      </p:sp>
+      <p:sp>
+        <p:nvSpPr>
+          <p:cNvPr id="181" name="Textfeld 180">
+            <a:extLst>
+              <a:ext uri="{FF2B5EF4-FFF2-40B4-BE49-F238E27FC236}">
+                <a16:creationId xmlns:a16="http://schemas.microsoft.com/office/drawing/2014/main" id="{E5BB6B98-D12D-45C6-810F-5F12CACCAFA0}"/>
+              </a:ext>
+            </a:extLst>
+          </p:cNvPr>
+          <p:cNvSpPr txBox="1"/>
+          <p:nvPr/>
+        </p:nvSpPr>
+        <p:spPr>
+          <a:xfrm>
+            <a:off x="3618152" y="779636"/>
+            <a:ext cx="359394" cy="369332"/>
+          </a:xfrm>
+          <a:prstGeom prst="rect">
+            <a:avLst/>
+          </a:prstGeom>
+          <a:noFill/>
+        </p:spPr>
+        <p:txBody>
+          <a:bodyPr wrap="none" rtlCol="0">
+            <a:spAutoFit/>
+          </a:bodyPr>
+          <a:lstStyle/>
+          <a:p>
+            <a:r>
+              <a:rPr lang="de-AT" dirty="0"/>
+              <a:t>3.</a:t>
+            </a:r>
+          </a:p>
+        </p:txBody>
+      </p:sp>
+      <p:sp>
+        <p:nvSpPr>
+          <p:cNvPr id="182" name="Textfeld 181">
+            <a:extLst>
+              <a:ext uri="{FF2B5EF4-FFF2-40B4-BE49-F238E27FC236}">
+                <a16:creationId xmlns:a16="http://schemas.microsoft.com/office/drawing/2014/main" id="{CD19758D-2ED2-41EE-AAB3-8A7926EDB8B4}"/>
+              </a:ext>
+            </a:extLst>
+          </p:cNvPr>
+          <p:cNvSpPr txBox="1"/>
+          <p:nvPr/>
+        </p:nvSpPr>
+        <p:spPr>
+          <a:xfrm>
+            <a:off x="5335723" y="780405"/>
+            <a:ext cx="359394" cy="369332"/>
+          </a:xfrm>
+          <a:prstGeom prst="rect">
+            <a:avLst/>
+          </a:prstGeom>
+          <a:noFill/>
+        </p:spPr>
+        <p:txBody>
+          <a:bodyPr wrap="none" rtlCol="0">
+            <a:spAutoFit/>
+          </a:bodyPr>
+          <a:lstStyle/>
+          <a:p>
+            <a:r>
+              <a:rPr lang="de-AT" dirty="0"/>
+              <a:t>4.</a:t>
+            </a:r>
+          </a:p>
+        </p:txBody>
+      </p:sp>
+      <p:sp>
+        <p:nvSpPr>
+          <p:cNvPr id="183" name="Textfeld 182">
+            <a:extLst>
+              <a:ext uri="{FF2B5EF4-FFF2-40B4-BE49-F238E27FC236}">
+                <a16:creationId xmlns:a16="http://schemas.microsoft.com/office/drawing/2014/main" id="{5C6A8113-7401-4709-BDB3-36370ED1D7F7}"/>
+              </a:ext>
+            </a:extLst>
+          </p:cNvPr>
+          <p:cNvSpPr txBox="1"/>
+          <p:nvPr/>
+        </p:nvSpPr>
+        <p:spPr>
+          <a:xfrm>
+            <a:off x="7049215" y="769804"/>
+            <a:ext cx="359394" cy="369332"/>
+          </a:xfrm>
+          <a:prstGeom prst="rect">
+            <a:avLst/>
+          </a:prstGeom>
+          <a:noFill/>
+        </p:spPr>
+        <p:txBody>
+          <a:bodyPr wrap="none" rtlCol="0">
+            <a:spAutoFit/>
+          </a:bodyPr>
+          <a:lstStyle/>
+          <a:p>
+            <a:r>
+              <a:rPr lang="de-AT" dirty="0"/>
+              <a:t>5.</a:t>
+            </a:r>
+          </a:p>
+        </p:txBody>
+      </p:sp>
+      <p:sp>
+        <p:nvSpPr>
+          <p:cNvPr id="184" name="Textfeld 183">
+            <a:extLst>
+              <a:ext uri="{FF2B5EF4-FFF2-40B4-BE49-F238E27FC236}">
+                <a16:creationId xmlns:a16="http://schemas.microsoft.com/office/drawing/2014/main" id="{E9C0F5A7-C9BE-48E0-81A1-1AA6175B2FDF}"/>
+              </a:ext>
+            </a:extLst>
+          </p:cNvPr>
+          <p:cNvSpPr txBox="1"/>
+          <p:nvPr/>
+        </p:nvSpPr>
+        <p:spPr>
+          <a:xfrm>
+            <a:off x="8770865" y="769670"/>
+            <a:ext cx="359394" cy="369332"/>
+          </a:xfrm>
+          <a:prstGeom prst="rect">
+            <a:avLst/>
+          </a:prstGeom>
+          <a:noFill/>
+        </p:spPr>
+        <p:txBody>
+          <a:bodyPr wrap="none" rtlCol="0">
+            <a:spAutoFit/>
+          </a:bodyPr>
+          <a:lstStyle/>
+          <a:p>
+            <a:r>
+              <a:rPr lang="de-AT" dirty="0"/>
+              <a:t>6.</a:t>
+            </a:r>
+          </a:p>
+        </p:txBody>
+      </p:sp>
+      <p:sp>
+        <p:nvSpPr>
+          <p:cNvPr id="185" name="Textfeld 184">
+            <a:extLst>
+              <a:ext uri="{FF2B5EF4-FFF2-40B4-BE49-F238E27FC236}">
+                <a16:creationId xmlns:a16="http://schemas.microsoft.com/office/drawing/2014/main" id="{A18E357B-2AED-4594-BA29-5F006C3781D3}"/>
+              </a:ext>
+            </a:extLst>
+          </p:cNvPr>
+          <p:cNvSpPr txBox="1"/>
+          <p:nvPr/>
+        </p:nvSpPr>
+        <p:spPr>
+          <a:xfrm>
+            <a:off x="10488435" y="769670"/>
+            <a:ext cx="359394" cy="369332"/>
+          </a:xfrm>
+          <a:prstGeom prst="rect">
+            <a:avLst/>
+          </a:prstGeom>
+          <a:noFill/>
+        </p:spPr>
+        <p:txBody>
+          <a:bodyPr wrap="none" rtlCol="0">
+            <a:spAutoFit/>
+          </a:bodyPr>
+          <a:lstStyle/>
+          <a:p>
+            <a:r>
+              <a:rPr lang="de-AT" dirty="0"/>
+              <a:t>7.</a:t>
+            </a:r>
+          </a:p>
+        </p:txBody>
+      </p:sp>
+      <p:sp>
+        <p:nvSpPr>
+          <p:cNvPr id="3" name="Textfeld 2">
+            <a:extLst>
+              <a:ext uri="{FF2B5EF4-FFF2-40B4-BE49-F238E27FC236}">
+                <a16:creationId xmlns:a16="http://schemas.microsoft.com/office/drawing/2014/main" id="{ED970598-D623-480A-874D-A1AAB519C1C1}"/>
+              </a:ext>
+            </a:extLst>
+          </p:cNvPr>
+          <p:cNvSpPr txBox="1"/>
+          <p:nvPr/>
+        </p:nvSpPr>
+        <p:spPr>
+          <a:xfrm>
+            <a:off x="235461" y="1798817"/>
+            <a:ext cx="604408" cy="307777"/>
+          </a:xfrm>
+          <a:prstGeom prst="rect">
+            <a:avLst/>
+          </a:prstGeom>
+          <a:noFill/>
+        </p:spPr>
+        <p:txBody>
+          <a:bodyPr wrap="square" rtlCol="0">
+            <a:spAutoFit/>
+          </a:bodyPr>
+          <a:lstStyle/>
+          <a:p>
+            <a:r>
+              <a:rPr lang="de-AT" sz="1400" dirty="0"/>
+              <a:t>1.1 </a:t>
+            </a:r>
+          </a:p>
+        </p:txBody>
+      </p:sp>
+      <p:sp>
+        <p:nvSpPr>
+          <p:cNvPr id="186" name="Textfeld 185">
+            <a:extLst>
+              <a:ext uri="{FF2B5EF4-FFF2-40B4-BE49-F238E27FC236}">
+                <a16:creationId xmlns:a16="http://schemas.microsoft.com/office/drawing/2014/main" id="{9379F0EB-0C51-445B-BEF9-3AF929E89CDD}"/>
+              </a:ext>
+            </a:extLst>
+          </p:cNvPr>
+          <p:cNvSpPr txBox="1"/>
+          <p:nvPr/>
+        </p:nvSpPr>
+        <p:spPr>
+          <a:xfrm>
+            <a:off x="240345" y="2581028"/>
+            <a:ext cx="604408" cy="307777"/>
+          </a:xfrm>
+          <a:prstGeom prst="rect">
+            <a:avLst/>
+          </a:prstGeom>
+          <a:noFill/>
+        </p:spPr>
+        <p:txBody>
+          <a:bodyPr wrap="square" rtlCol="0">
+            <a:spAutoFit/>
+          </a:bodyPr>
+          <a:lstStyle/>
+          <a:p>
+            <a:r>
+              <a:rPr lang="de-AT" sz="1400" dirty="0"/>
+              <a:t>1.2 </a:t>
+            </a:r>
+          </a:p>
+        </p:txBody>
+      </p:sp>
+      <p:sp>
+        <p:nvSpPr>
+          <p:cNvPr id="187" name="Textfeld 186">
+            <a:extLst>
+              <a:ext uri="{FF2B5EF4-FFF2-40B4-BE49-F238E27FC236}">
+                <a16:creationId xmlns:a16="http://schemas.microsoft.com/office/drawing/2014/main" id="{73C40AD5-27F3-46E5-9048-5588A3168EA0}"/>
+              </a:ext>
+            </a:extLst>
+          </p:cNvPr>
+          <p:cNvSpPr txBox="1"/>
+          <p:nvPr/>
+        </p:nvSpPr>
+        <p:spPr>
+          <a:xfrm>
+            <a:off x="237136" y="3377842"/>
+            <a:ext cx="604408" cy="307777"/>
+          </a:xfrm>
+          <a:prstGeom prst="rect">
+            <a:avLst/>
+          </a:prstGeom>
+          <a:noFill/>
+        </p:spPr>
+        <p:txBody>
+          <a:bodyPr wrap="square" rtlCol="0">
+            <a:spAutoFit/>
+          </a:bodyPr>
+          <a:lstStyle/>
+          <a:p>
+            <a:r>
+              <a:rPr lang="de-AT" sz="1400" dirty="0"/>
+              <a:t>1.3 </a:t>
+            </a:r>
+          </a:p>
+        </p:txBody>
+      </p:sp>
+      <p:sp>
+        <p:nvSpPr>
+          <p:cNvPr id="188" name="Textfeld 187">
+            <a:extLst>
+              <a:ext uri="{FF2B5EF4-FFF2-40B4-BE49-F238E27FC236}">
+                <a16:creationId xmlns:a16="http://schemas.microsoft.com/office/drawing/2014/main" id="{C6F83C5A-0813-4CD2-A9C0-9D4E67385895}"/>
+              </a:ext>
+            </a:extLst>
+          </p:cNvPr>
+          <p:cNvSpPr txBox="1"/>
+          <p:nvPr/>
+        </p:nvSpPr>
+        <p:spPr>
+          <a:xfrm>
+            <a:off x="721678" y="4092933"/>
+            <a:ext cx="604408" cy="307777"/>
+          </a:xfrm>
+          <a:prstGeom prst="rect">
+            <a:avLst/>
+          </a:prstGeom>
+          <a:noFill/>
+        </p:spPr>
+        <p:txBody>
+          <a:bodyPr wrap="square" rtlCol="0">
+            <a:spAutoFit/>
+          </a:bodyPr>
+          <a:lstStyle/>
+          <a:p>
+            <a:r>
+              <a:rPr lang="de-AT" sz="1400" dirty="0"/>
+              <a:t>1.4 </a:t>
+            </a:r>
+          </a:p>
+        </p:txBody>
+      </p:sp>
+      <p:sp>
+        <p:nvSpPr>
+          <p:cNvPr id="189" name="Textfeld 188">
+            <a:extLst>
+              <a:ext uri="{FF2B5EF4-FFF2-40B4-BE49-F238E27FC236}">
+                <a16:creationId xmlns:a16="http://schemas.microsoft.com/office/drawing/2014/main" id="{590BB546-B4D8-4873-B2D1-14F2D4846C66}"/>
+              </a:ext>
+            </a:extLst>
+          </p:cNvPr>
+          <p:cNvSpPr txBox="1"/>
+          <p:nvPr/>
+        </p:nvSpPr>
+        <p:spPr>
+          <a:xfrm>
+            <a:off x="235461" y="5048732"/>
+            <a:ext cx="604408" cy="307777"/>
+          </a:xfrm>
+          <a:prstGeom prst="rect">
+            <a:avLst/>
+          </a:prstGeom>
+          <a:noFill/>
+        </p:spPr>
+        <p:txBody>
+          <a:bodyPr wrap="square" rtlCol="0">
+            <a:spAutoFit/>
+          </a:bodyPr>
+          <a:lstStyle/>
+          <a:p>
+            <a:r>
+              <a:rPr lang="de-AT" sz="1400" dirty="0"/>
+              <a:t>1.5 </a:t>
+            </a:r>
+          </a:p>
+        </p:txBody>
+      </p:sp>
+      <p:sp>
+        <p:nvSpPr>
+          <p:cNvPr id="190" name="Textfeld 189">
+            <a:extLst>
+              <a:ext uri="{FF2B5EF4-FFF2-40B4-BE49-F238E27FC236}">
+                <a16:creationId xmlns:a16="http://schemas.microsoft.com/office/drawing/2014/main" id="{A631C7B7-EC53-4BA5-A0B8-2FB4AF6C0B13}"/>
+              </a:ext>
+            </a:extLst>
+          </p:cNvPr>
+          <p:cNvSpPr txBox="1"/>
+          <p:nvPr/>
+        </p:nvSpPr>
+        <p:spPr>
+          <a:xfrm>
+            <a:off x="722730" y="5770176"/>
+            <a:ext cx="604408" cy="307777"/>
+          </a:xfrm>
+          <a:prstGeom prst="rect">
+            <a:avLst/>
+          </a:prstGeom>
+          <a:noFill/>
+        </p:spPr>
+        <p:txBody>
+          <a:bodyPr wrap="square" rtlCol="0">
+            <a:spAutoFit/>
+          </a:bodyPr>
+          <a:lstStyle/>
+          <a:p>
+            <a:r>
+              <a:rPr lang="de-AT" sz="1400" dirty="0"/>
+              <a:t>1.7</a:t>
+            </a:r>
+          </a:p>
+        </p:txBody>
+      </p:sp>
+      <p:sp>
+        <p:nvSpPr>
+          <p:cNvPr id="191" name="Textfeld 190">
+            <a:extLst>
+              <a:ext uri="{FF2B5EF4-FFF2-40B4-BE49-F238E27FC236}">
+                <a16:creationId xmlns:a16="http://schemas.microsoft.com/office/drawing/2014/main" id="{103D9A8E-6EF5-4A50-B12B-5BE48ABE0450}"/>
+              </a:ext>
+            </a:extLst>
+          </p:cNvPr>
+          <p:cNvSpPr txBox="1"/>
+          <p:nvPr/>
+        </p:nvSpPr>
+        <p:spPr>
+          <a:xfrm>
+            <a:off x="1957759" y="1818481"/>
+            <a:ext cx="604408" cy="307777"/>
+          </a:xfrm>
+          <a:prstGeom prst="rect">
+            <a:avLst/>
+          </a:prstGeom>
+          <a:noFill/>
+        </p:spPr>
+        <p:txBody>
+          <a:bodyPr wrap="square" rtlCol="0">
+            <a:spAutoFit/>
+          </a:bodyPr>
+          <a:lstStyle/>
+          <a:p>
+            <a:r>
+              <a:rPr lang="de-AT" sz="1400" dirty="0"/>
+              <a:t>2.1 </a:t>
+            </a:r>
+          </a:p>
+        </p:txBody>
+      </p:sp>
+      <p:sp>
+        <p:nvSpPr>
+          <p:cNvPr id="192" name="Textfeld 191">
+            <a:extLst>
+              <a:ext uri="{FF2B5EF4-FFF2-40B4-BE49-F238E27FC236}">
+                <a16:creationId xmlns:a16="http://schemas.microsoft.com/office/drawing/2014/main" id="{AF7137B9-A75D-44E2-9885-A36BE9D54DB7}"/>
+              </a:ext>
+            </a:extLst>
+          </p:cNvPr>
+          <p:cNvSpPr txBox="1"/>
+          <p:nvPr/>
+        </p:nvSpPr>
+        <p:spPr>
+          <a:xfrm>
+            <a:off x="1951070" y="2600692"/>
+            <a:ext cx="604408" cy="523220"/>
+          </a:xfrm>
+          <a:prstGeom prst="rect">
+            <a:avLst/>
+          </a:prstGeom>
+          <a:noFill/>
+        </p:spPr>
+        <p:txBody>
+          <a:bodyPr wrap="square" rtlCol="0">
+            <a:spAutoFit/>
+          </a:bodyPr>
+          <a:lstStyle/>
+          <a:p>
+            <a:r>
+              <a:rPr lang="de-AT" sz="1400" dirty="0"/>
+              <a:t>2.2	 </a:t>
+            </a:r>
+          </a:p>
+        </p:txBody>
+      </p:sp>
+      <p:sp>
+        <p:nvSpPr>
+          <p:cNvPr id="193" name="Textfeld 192">
+            <a:extLst>
+              <a:ext uri="{FF2B5EF4-FFF2-40B4-BE49-F238E27FC236}">
+                <a16:creationId xmlns:a16="http://schemas.microsoft.com/office/drawing/2014/main" id="{FAE0EB72-5C58-4416-8E36-3BE3BD5883E5}"/>
+              </a:ext>
+            </a:extLst>
+          </p:cNvPr>
+          <p:cNvSpPr txBox="1"/>
+          <p:nvPr/>
+        </p:nvSpPr>
+        <p:spPr>
+          <a:xfrm>
+            <a:off x="2454684" y="3318545"/>
+            <a:ext cx="604408" cy="307777"/>
+          </a:xfrm>
+          <a:prstGeom prst="rect">
+            <a:avLst/>
+          </a:prstGeom>
+          <a:noFill/>
+        </p:spPr>
+        <p:txBody>
+          <a:bodyPr wrap="square" rtlCol="0">
+            <a:spAutoFit/>
+          </a:bodyPr>
+          <a:lstStyle/>
+          <a:p>
+            <a:r>
+              <a:rPr lang="de-AT" sz="1400" dirty="0"/>
+              <a:t>2.3</a:t>
+            </a:r>
+          </a:p>
+        </p:txBody>
+      </p:sp>
+      <p:sp>
+        <p:nvSpPr>
+          <p:cNvPr id="194" name="Textfeld 193">
+            <a:extLst>
+              <a:ext uri="{FF2B5EF4-FFF2-40B4-BE49-F238E27FC236}">
+                <a16:creationId xmlns:a16="http://schemas.microsoft.com/office/drawing/2014/main" id="{23534DC5-6058-4FB3-B966-B8152C722F5B}"/>
+              </a:ext>
+            </a:extLst>
+          </p:cNvPr>
+          <p:cNvSpPr txBox="1"/>
+          <p:nvPr/>
+        </p:nvSpPr>
+        <p:spPr>
+          <a:xfrm>
+            <a:off x="1977423" y="4282520"/>
+            <a:ext cx="604408" cy="307777"/>
+          </a:xfrm>
+          <a:prstGeom prst="rect">
+            <a:avLst/>
+          </a:prstGeom>
+          <a:noFill/>
+        </p:spPr>
+        <p:txBody>
+          <a:bodyPr wrap="square" rtlCol="0">
+            <a:spAutoFit/>
+          </a:bodyPr>
+          <a:lstStyle/>
+          <a:p>
+            <a:r>
+              <a:rPr lang="de-AT" sz="1400" dirty="0"/>
+              <a:t>2.4 </a:t>
+            </a:r>
+          </a:p>
+        </p:txBody>
+      </p:sp>
+      <p:sp>
+        <p:nvSpPr>
+          <p:cNvPr id="195" name="Textfeld 194">
+            <a:extLst>
+              <a:ext uri="{FF2B5EF4-FFF2-40B4-BE49-F238E27FC236}">
+                <a16:creationId xmlns:a16="http://schemas.microsoft.com/office/drawing/2014/main" id="{E83D7E60-B360-4AC6-BD8C-D5E505F7C05C}"/>
+              </a:ext>
+            </a:extLst>
+          </p:cNvPr>
+          <p:cNvSpPr txBox="1"/>
+          <p:nvPr/>
+        </p:nvSpPr>
+        <p:spPr>
+          <a:xfrm>
+            <a:off x="1970514" y="5058096"/>
+            <a:ext cx="604408" cy="307777"/>
+          </a:xfrm>
+          <a:prstGeom prst="rect">
+            <a:avLst/>
+          </a:prstGeom>
+          <a:noFill/>
+        </p:spPr>
+        <p:txBody>
+          <a:bodyPr wrap="square" rtlCol="0">
+            <a:spAutoFit/>
+          </a:bodyPr>
+          <a:lstStyle/>
+          <a:p>
+            <a:r>
+              <a:rPr lang="de-AT" sz="1400" dirty="0"/>
+              <a:t>2.5</a:t>
+            </a:r>
+          </a:p>
+        </p:txBody>
+      </p:sp>
+      <p:sp>
+        <p:nvSpPr>
+          <p:cNvPr id="196" name="Textfeld 195">
+            <a:extLst>
+              <a:ext uri="{FF2B5EF4-FFF2-40B4-BE49-F238E27FC236}">
+                <a16:creationId xmlns:a16="http://schemas.microsoft.com/office/drawing/2014/main" id="{5D5B87EC-78EE-42A3-A903-592145DAC70A}"/>
+              </a:ext>
+            </a:extLst>
+          </p:cNvPr>
+          <p:cNvSpPr txBox="1"/>
+          <p:nvPr/>
+        </p:nvSpPr>
+        <p:spPr>
+          <a:xfrm>
+            <a:off x="2437206" y="5786245"/>
+            <a:ext cx="604408" cy="307777"/>
+          </a:xfrm>
+          <a:prstGeom prst="rect">
+            <a:avLst/>
+          </a:prstGeom>
+          <a:noFill/>
+        </p:spPr>
+        <p:txBody>
+          <a:bodyPr wrap="square" rtlCol="0">
+            <a:spAutoFit/>
+          </a:bodyPr>
+          <a:lstStyle/>
+          <a:p>
+            <a:r>
+              <a:rPr lang="de-AT" sz="1400" dirty="0"/>
+              <a:t>2.6 </a:t>
+            </a:r>
+          </a:p>
+        </p:txBody>
+      </p:sp>
+      <p:sp>
+        <p:nvSpPr>
+          <p:cNvPr id="6" name="Textfeld 5">
+            <a:extLst>
+              <a:ext uri="{FF2B5EF4-FFF2-40B4-BE49-F238E27FC236}">
+                <a16:creationId xmlns:a16="http://schemas.microsoft.com/office/drawing/2014/main" id="{DDE2EC08-504D-42FF-8766-F9462065050B}"/>
+              </a:ext>
+            </a:extLst>
+          </p:cNvPr>
+          <p:cNvSpPr txBox="1"/>
+          <p:nvPr/>
+        </p:nvSpPr>
+        <p:spPr>
+          <a:xfrm>
+            <a:off x="4570830" y="161624"/>
+            <a:ext cx="3647765" cy="738664"/>
+          </a:xfrm>
+          <a:prstGeom prst="rect">
+            <a:avLst/>
+          </a:prstGeom>
+          <a:noFill/>
+        </p:spPr>
+        <p:txBody>
+          <a:bodyPr wrap="square" rtlCol="0">
+            <a:spAutoFit/>
+          </a:bodyPr>
+          <a:lstStyle/>
+          <a:p>
+            <a:r>
+              <a:rPr lang="de-AT" sz="2400" b="1" dirty="0" err="1"/>
+              <a:t>Projectstructureplan</a:t>
+            </a:r>
+            <a:r>
+              <a:rPr lang="de-AT" sz="2400" b="1" dirty="0"/>
+              <a:t> (PSP)</a:t>
+            </a:r>
+          </a:p>
+          <a:p>
+            <a:endParaRPr lang="de-AT" dirty="0"/>
+          </a:p>
+        </p:txBody>
+      </p:sp>
+      <p:grpSp>
+        <p:nvGrpSpPr>
+          <p:cNvPr id="197" name="Gruppieren 196">
+            <a:extLst>
+              <a:ext uri="{FF2B5EF4-FFF2-40B4-BE49-F238E27FC236}">
+                <a16:creationId xmlns:a16="http://schemas.microsoft.com/office/drawing/2014/main" id="{4CDB629D-13CD-475C-A096-FF425DE09E52}"/>
+              </a:ext>
+            </a:extLst>
+          </p:cNvPr>
+          <p:cNvGrpSpPr/>
+          <p:nvPr/>
+        </p:nvGrpSpPr>
+        <p:grpSpPr>
+          <a:xfrm>
+            <a:off x="3772572" y="1896674"/>
+            <a:ext cx="1270129" cy="644606"/>
+            <a:chOff x="1101012" y="1380932"/>
+            <a:chExt cx="1651519" cy="886408"/>
+          </a:xfrm>
+        </p:grpSpPr>
+        <p:sp>
+          <p:nvSpPr>
+            <p:cNvPr id="198" name="Rechteck 197">
+              <a:extLst>
+                <a:ext uri="{FF2B5EF4-FFF2-40B4-BE49-F238E27FC236}">
+                  <a16:creationId xmlns:a16="http://schemas.microsoft.com/office/drawing/2014/main" id="{3A260568-74C1-469C-993C-EBF56407908A}"/>
+                </a:ext>
+              </a:extLst>
+            </p:cNvPr>
+            <p:cNvSpPr/>
+            <p:nvPr/>
+          </p:nvSpPr>
+          <p:spPr>
+            <a:xfrm>
+              <a:off x="1101012" y="1380932"/>
+              <a:ext cx="1651519" cy="886408"/>
+            </a:xfrm>
+            <a:prstGeom prst="rect">
+              <a:avLst/>
+            </a:prstGeom>
+            <a:solidFill>
+              <a:schemeClr val="bg1"/>
+            </a:solidFill>
+            <a:ln>
+              <a:solidFill>
+                <a:schemeClr val="tx1"/>
+              </a:solidFill>
+            </a:ln>
+          </p:spPr>
+          <p:style>
+            <a:lnRef idx="2">
+              <a:schemeClr val="accent1">
+                <a:shade val="50000"/>
+              </a:schemeClr>
+            </a:lnRef>
+            <a:fillRef idx="1">
+              <a:schemeClr val="accent1"/>
+            </a:fillRef>
+            <a:effectRef idx="0">
+              <a:schemeClr val="accent1"/>
+            </a:effectRef>
+            <a:fontRef idx="minor">
+              <a:schemeClr val="lt1"/>
+            </a:fontRef>
+          </p:style>
+          <p:txBody>
+            <a:bodyPr rtlCol="0" anchor="ctr"/>
+            <a:lstStyle/>
+            <a:p>
+              <a:pPr algn="ctr"/>
+              <a:r>
+                <a:rPr lang="de-AT" sz="1500" dirty="0" err="1">
+                  <a:solidFill>
+                    <a:schemeClr val="tx1"/>
+                  </a:solidFill>
+                </a:rPr>
+                <a:t>Define</a:t>
+              </a:r>
+              <a:r>
+                <a:rPr lang="de-AT" sz="1500" dirty="0">
+                  <a:solidFill>
+                    <a:schemeClr val="tx1"/>
+                  </a:solidFill>
+                </a:rPr>
+                <a:t> </a:t>
+              </a:r>
+              <a:r>
+                <a:rPr lang="de-AT" sz="1500" dirty="0" err="1">
+                  <a:solidFill>
+                    <a:schemeClr val="tx1"/>
+                  </a:solidFill>
+                </a:rPr>
+                <a:t>database</a:t>
+              </a:r>
+              <a:r>
+                <a:rPr lang="de-AT" sz="1500" dirty="0">
+                  <a:solidFill>
+                    <a:schemeClr val="tx1"/>
+                  </a:solidFill>
+                </a:rPr>
+                <a:t>  &amp; </a:t>
+              </a:r>
+              <a:r>
+                <a:rPr lang="de-AT" sz="1500" dirty="0" err="1">
+                  <a:solidFill>
+                    <a:schemeClr val="tx1"/>
+                  </a:solidFill>
+                </a:rPr>
+                <a:t>tables</a:t>
+              </a:r>
+              <a:endParaRPr lang="de-AT" sz="1500" dirty="0">
+                <a:solidFill>
+                  <a:schemeClr val="tx1"/>
+                </a:solidFill>
+              </a:endParaRPr>
+            </a:p>
+          </p:txBody>
+        </p:sp>
+        <p:grpSp>
+          <p:nvGrpSpPr>
+            <p:cNvPr id="199" name="Gruppieren 198">
+              <a:extLst>
+                <a:ext uri="{FF2B5EF4-FFF2-40B4-BE49-F238E27FC236}">
+                  <a16:creationId xmlns:a16="http://schemas.microsoft.com/office/drawing/2014/main" id="{A0036E47-F8AB-4B16-9D8B-ADDEF7A8E358}"/>
+                </a:ext>
+              </a:extLst>
+            </p:cNvPr>
+            <p:cNvGrpSpPr/>
+            <p:nvPr/>
+          </p:nvGrpSpPr>
+          <p:grpSpPr>
+            <a:xfrm>
+              <a:off x="2379306" y="1380932"/>
+              <a:ext cx="373224" cy="270586"/>
+              <a:chOff x="2379306" y="1380932"/>
+              <a:chExt cx="373224" cy="270586"/>
+            </a:xfrm>
+          </p:grpSpPr>
+          <p:cxnSp>
+            <p:nvCxnSpPr>
+              <p:cNvPr id="203" name="Gerader Verbinder 202">
+                <a:extLst>
+                  <a:ext uri="{FF2B5EF4-FFF2-40B4-BE49-F238E27FC236}">
+                    <a16:creationId xmlns:a16="http://schemas.microsoft.com/office/drawing/2014/main" id="{6EBF953E-6D4A-4F7C-A1BE-320B2D5C63DA}"/>
+                  </a:ext>
+                </a:extLst>
+              </p:cNvPr>
+              <p:cNvCxnSpPr>
+                <a:cxnSpLocks/>
+              </p:cNvCxnSpPr>
+              <p:nvPr/>
+            </p:nvCxnSpPr>
+            <p:spPr>
+              <a:xfrm>
+                <a:off x="2379306" y="1380932"/>
+                <a:ext cx="0" cy="270586"/>
+              </a:xfrm>
+              <a:prstGeom prst="line">
+                <a:avLst/>
+              </a:prstGeom>
+              <a:ln>
+                <a:solidFill>
+                  <a:schemeClr val="tx1"/>
+                </a:solidFill>
+              </a:ln>
+            </p:spPr>
+            <p:style>
+              <a:lnRef idx="1">
+                <a:schemeClr val="accent1"/>
+              </a:lnRef>
+              <a:fillRef idx="0">
+                <a:schemeClr val="accent1"/>
+              </a:fillRef>
+              <a:effectRef idx="0">
+                <a:schemeClr val="accent1"/>
+              </a:effectRef>
+              <a:fontRef idx="minor">
+                <a:schemeClr val="tx1"/>
+              </a:fontRef>
+            </p:style>
+          </p:cxnSp>
+          <p:cxnSp>
+            <p:nvCxnSpPr>
+              <p:cNvPr id="204" name="Gerader Verbinder 203">
+                <a:extLst>
+                  <a:ext uri="{FF2B5EF4-FFF2-40B4-BE49-F238E27FC236}">
+                    <a16:creationId xmlns:a16="http://schemas.microsoft.com/office/drawing/2014/main" id="{8E8AAA0A-5568-401E-B49D-8276F4F2E586}"/>
+                  </a:ext>
+                </a:extLst>
+              </p:cNvPr>
+              <p:cNvCxnSpPr>
+                <a:cxnSpLocks/>
+              </p:cNvCxnSpPr>
+              <p:nvPr/>
+            </p:nvCxnSpPr>
+            <p:spPr>
+              <a:xfrm>
+                <a:off x="2379306" y="1651518"/>
+                <a:ext cx="373224" cy="0"/>
+              </a:xfrm>
+              <a:prstGeom prst="line">
+                <a:avLst/>
+              </a:prstGeom>
+              <a:ln>
+                <a:solidFill>
+                  <a:schemeClr val="tx1"/>
+                </a:solidFill>
+              </a:ln>
+            </p:spPr>
+            <p:style>
+              <a:lnRef idx="1">
+                <a:schemeClr val="accent1"/>
+              </a:lnRef>
+              <a:fillRef idx="0">
+                <a:schemeClr val="accent1"/>
+              </a:fillRef>
+              <a:effectRef idx="0">
+                <a:schemeClr val="accent1"/>
+              </a:effectRef>
+              <a:fontRef idx="minor">
+                <a:schemeClr val="tx1"/>
+              </a:fontRef>
+            </p:style>
+          </p:cxnSp>
+        </p:grpSp>
+        <p:grpSp>
+          <p:nvGrpSpPr>
+            <p:cNvPr id="200" name="Gruppieren 199">
+              <a:extLst>
+                <a:ext uri="{FF2B5EF4-FFF2-40B4-BE49-F238E27FC236}">
+                  <a16:creationId xmlns:a16="http://schemas.microsoft.com/office/drawing/2014/main" id="{80662BE2-E665-47CE-A1FD-4F90C064A0F4}"/>
+                </a:ext>
+              </a:extLst>
+            </p:cNvPr>
+            <p:cNvGrpSpPr/>
+            <p:nvPr/>
+          </p:nvGrpSpPr>
+          <p:grpSpPr>
+            <a:xfrm>
+              <a:off x="1101012" y="1380932"/>
+              <a:ext cx="373224" cy="270586"/>
+              <a:chOff x="1101012" y="1380932"/>
+              <a:chExt cx="373224" cy="270586"/>
+            </a:xfrm>
+          </p:grpSpPr>
+          <p:cxnSp>
+            <p:nvCxnSpPr>
+              <p:cNvPr id="201" name="Gerader Verbinder 200">
+                <a:extLst>
+                  <a:ext uri="{FF2B5EF4-FFF2-40B4-BE49-F238E27FC236}">
+                    <a16:creationId xmlns:a16="http://schemas.microsoft.com/office/drawing/2014/main" id="{B603D397-EE9E-47AD-BA7E-73597EFB85D1}"/>
+                  </a:ext>
+                </a:extLst>
+              </p:cNvPr>
+              <p:cNvCxnSpPr>
+                <a:cxnSpLocks/>
+              </p:cNvCxnSpPr>
+              <p:nvPr/>
+            </p:nvCxnSpPr>
+            <p:spPr>
+              <a:xfrm>
+                <a:off x="1474236" y="1380932"/>
+                <a:ext cx="0" cy="270586"/>
+              </a:xfrm>
+              <a:prstGeom prst="line">
+                <a:avLst/>
+              </a:prstGeom>
+              <a:ln>
+                <a:solidFill>
+                  <a:schemeClr val="tx1"/>
+                </a:solidFill>
+              </a:ln>
+            </p:spPr>
+            <p:style>
+              <a:lnRef idx="1">
+                <a:schemeClr val="accent1"/>
+              </a:lnRef>
+              <a:fillRef idx="0">
+                <a:schemeClr val="accent1"/>
+              </a:fillRef>
+              <a:effectRef idx="0">
+                <a:schemeClr val="accent1"/>
+              </a:effectRef>
+              <a:fontRef idx="minor">
+                <a:schemeClr val="tx1"/>
+              </a:fontRef>
+            </p:style>
+          </p:cxnSp>
+          <p:cxnSp>
+            <p:nvCxnSpPr>
+              <p:cNvPr id="202" name="Gerader Verbinder 201">
+                <a:extLst>
+                  <a:ext uri="{FF2B5EF4-FFF2-40B4-BE49-F238E27FC236}">
+                    <a16:creationId xmlns:a16="http://schemas.microsoft.com/office/drawing/2014/main" id="{9922DA9D-E06F-42F1-A649-2007D61FACB2}"/>
+                  </a:ext>
+                </a:extLst>
+              </p:cNvPr>
+              <p:cNvCxnSpPr>
+                <a:cxnSpLocks/>
+              </p:cNvCxnSpPr>
+              <p:nvPr/>
+            </p:nvCxnSpPr>
+            <p:spPr>
+              <a:xfrm>
+                <a:off x="1101012" y="1651518"/>
+                <a:ext cx="373224" cy="0"/>
+              </a:xfrm>
+              <a:prstGeom prst="line">
+                <a:avLst/>
+              </a:prstGeom>
+              <a:ln>
+                <a:solidFill>
+                  <a:schemeClr val="tx1"/>
+                </a:solidFill>
+              </a:ln>
+            </p:spPr>
+            <p:style>
+              <a:lnRef idx="1">
+                <a:schemeClr val="accent1"/>
+              </a:lnRef>
+              <a:fillRef idx="0">
+                <a:schemeClr val="accent1"/>
+              </a:fillRef>
+              <a:effectRef idx="0">
+                <a:schemeClr val="accent1"/>
+              </a:effectRef>
+              <a:fontRef idx="minor">
+                <a:schemeClr val="tx1"/>
+              </a:fontRef>
+            </p:style>
+          </p:cxnSp>
+        </p:grpSp>
+      </p:grpSp>
+      <p:grpSp>
+        <p:nvGrpSpPr>
+          <p:cNvPr id="205" name="Gruppieren 204">
+            <a:extLst>
+              <a:ext uri="{FF2B5EF4-FFF2-40B4-BE49-F238E27FC236}">
+                <a16:creationId xmlns:a16="http://schemas.microsoft.com/office/drawing/2014/main" id="{B7024167-CB61-41F9-968F-D4577C864D61}"/>
+              </a:ext>
+            </a:extLst>
+          </p:cNvPr>
+          <p:cNvGrpSpPr/>
+          <p:nvPr/>
+        </p:nvGrpSpPr>
+        <p:grpSpPr>
+          <a:xfrm>
+            <a:off x="3772572" y="2673969"/>
+            <a:ext cx="1270129" cy="644606"/>
+            <a:chOff x="1101012" y="1380932"/>
+            <a:chExt cx="1651519" cy="886408"/>
+          </a:xfrm>
+        </p:grpSpPr>
+        <p:sp>
+          <p:nvSpPr>
+            <p:cNvPr id="206" name="Rechteck 205">
+              <a:extLst>
+                <a:ext uri="{FF2B5EF4-FFF2-40B4-BE49-F238E27FC236}">
+                  <a16:creationId xmlns:a16="http://schemas.microsoft.com/office/drawing/2014/main" id="{7D3BB87F-6C25-4293-9B61-508C2749290E}"/>
+                </a:ext>
+              </a:extLst>
+            </p:cNvPr>
+            <p:cNvSpPr/>
+            <p:nvPr/>
+          </p:nvSpPr>
+          <p:spPr>
+            <a:xfrm>
+              <a:off x="1101012" y="1380932"/>
+              <a:ext cx="1651519" cy="886408"/>
+            </a:xfrm>
+            <a:prstGeom prst="rect">
+              <a:avLst/>
+            </a:prstGeom>
+            <a:solidFill>
+              <a:schemeClr val="bg1"/>
+            </a:solidFill>
+            <a:ln>
+              <a:solidFill>
+                <a:schemeClr val="tx1"/>
+              </a:solidFill>
+            </a:ln>
+          </p:spPr>
+          <p:style>
+            <a:lnRef idx="2">
+              <a:schemeClr val="accent1">
+                <a:shade val="50000"/>
+              </a:schemeClr>
+            </a:lnRef>
+            <a:fillRef idx="1">
+              <a:schemeClr val="accent1"/>
+            </a:fillRef>
+            <a:effectRef idx="0">
+              <a:schemeClr val="accent1"/>
+            </a:effectRef>
+            <a:fontRef idx="minor">
+              <a:schemeClr val="lt1"/>
+            </a:fontRef>
+          </p:style>
+          <p:txBody>
+            <a:bodyPr rtlCol="0" anchor="ctr"/>
+            <a:lstStyle/>
+            <a:p>
+              <a:pPr algn="ctr"/>
+              <a:r>
+                <a:rPr lang="de-AT" sz="1600" dirty="0" err="1">
+                  <a:solidFill>
+                    <a:schemeClr val="tx1"/>
+                  </a:solidFill>
+                </a:rPr>
+                <a:t>Define</a:t>
+              </a:r>
+              <a:r>
+                <a:rPr lang="de-AT" sz="1600" dirty="0">
+                  <a:solidFill>
+                    <a:schemeClr val="tx1"/>
+                  </a:solidFill>
+                </a:rPr>
+                <a:t> </a:t>
+              </a:r>
+              <a:r>
+                <a:rPr lang="de-AT" sz="1600" dirty="0" err="1">
+                  <a:solidFill>
+                    <a:schemeClr val="tx1"/>
+                  </a:solidFill>
+                </a:rPr>
+                <a:t>relations</a:t>
+              </a:r>
+              <a:endParaRPr lang="de-AT" sz="1600" dirty="0">
+                <a:solidFill>
+                  <a:schemeClr val="tx1"/>
+                </a:solidFill>
+              </a:endParaRPr>
+            </a:p>
+          </p:txBody>
+        </p:sp>
+        <p:grpSp>
+          <p:nvGrpSpPr>
+            <p:cNvPr id="207" name="Gruppieren 206">
+              <a:extLst>
+                <a:ext uri="{FF2B5EF4-FFF2-40B4-BE49-F238E27FC236}">
+                  <a16:creationId xmlns:a16="http://schemas.microsoft.com/office/drawing/2014/main" id="{C6B1CF66-CEF1-45E8-A9CD-C875738D9969}"/>
+                </a:ext>
+              </a:extLst>
+            </p:cNvPr>
+            <p:cNvGrpSpPr/>
+            <p:nvPr/>
+          </p:nvGrpSpPr>
+          <p:grpSpPr>
+            <a:xfrm>
+              <a:off x="2379306" y="1380932"/>
+              <a:ext cx="373224" cy="270586"/>
+              <a:chOff x="2379306" y="1380932"/>
+              <a:chExt cx="373224" cy="270586"/>
+            </a:xfrm>
+          </p:grpSpPr>
+          <p:cxnSp>
+            <p:nvCxnSpPr>
+              <p:cNvPr id="211" name="Gerader Verbinder 210">
+                <a:extLst>
+                  <a:ext uri="{FF2B5EF4-FFF2-40B4-BE49-F238E27FC236}">
+                    <a16:creationId xmlns:a16="http://schemas.microsoft.com/office/drawing/2014/main" id="{3B296B2B-3F1F-45C5-AF2C-520E3B3BA542}"/>
+                  </a:ext>
+                </a:extLst>
+              </p:cNvPr>
+              <p:cNvCxnSpPr>
+                <a:cxnSpLocks/>
+              </p:cNvCxnSpPr>
+              <p:nvPr/>
+            </p:nvCxnSpPr>
+            <p:spPr>
+              <a:xfrm>
+                <a:off x="2379306" y="1380932"/>
+                <a:ext cx="0" cy="270586"/>
+              </a:xfrm>
+              <a:prstGeom prst="line">
+                <a:avLst/>
+              </a:prstGeom>
+              <a:ln>
+                <a:solidFill>
+                  <a:schemeClr val="tx1"/>
+                </a:solidFill>
+              </a:ln>
+            </p:spPr>
+            <p:style>
+              <a:lnRef idx="1">
+                <a:schemeClr val="accent1"/>
+              </a:lnRef>
+              <a:fillRef idx="0">
+                <a:schemeClr val="accent1"/>
+              </a:fillRef>
+              <a:effectRef idx="0">
+                <a:schemeClr val="accent1"/>
+              </a:effectRef>
+              <a:fontRef idx="minor">
+                <a:schemeClr val="tx1"/>
+              </a:fontRef>
+            </p:style>
+          </p:cxnSp>
+          <p:cxnSp>
+            <p:nvCxnSpPr>
+              <p:cNvPr id="212" name="Gerader Verbinder 211">
+                <a:extLst>
+                  <a:ext uri="{FF2B5EF4-FFF2-40B4-BE49-F238E27FC236}">
+                    <a16:creationId xmlns:a16="http://schemas.microsoft.com/office/drawing/2014/main" id="{C7552FBC-96FE-4746-91FF-F5EC8BAD8112}"/>
+                  </a:ext>
+                </a:extLst>
+              </p:cNvPr>
+              <p:cNvCxnSpPr>
+                <a:cxnSpLocks/>
+              </p:cNvCxnSpPr>
+              <p:nvPr/>
+            </p:nvCxnSpPr>
+            <p:spPr>
+              <a:xfrm>
+                <a:off x="2379306" y="1651518"/>
+                <a:ext cx="373224" cy="0"/>
+              </a:xfrm>
+              <a:prstGeom prst="line">
+                <a:avLst/>
+              </a:prstGeom>
+              <a:ln>
+                <a:solidFill>
+                  <a:schemeClr val="tx1"/>
+                </a:solidFill>
+              </a:ln>
+            </p:spPr>
+            <p:style>
+              <a:lnRef idx="1">
+                <a:schemeClr val="accent1"/>
+              </a:lnRef>
+              <a:fillRef idx="0">
+                <a:schemeClr val="accent1"/>
+              </a:fillRef>
+              <a:effectRef idx="0">
+                <a:schemeClr val="accent1"/>
+              </a:effectRef>
+              <a:fontRef idx="minor">
+                <a:schemeClr val="tx1"/>
+              </a:fontRef>
+            </p:style>
+          </p:cxnSp>
+        </p:grpSp>
+        <p:grpSp>
+          <p:nvGrpSpPr>
+            <p:cNvPr id="208" name="Gruppieren 207">
+              <a:extLst>
+                <a:ext uri="{FF2B5EF4-FFF2-40B4-BE49-F238E27FC236}">
+                  <a16:creationId xmlns:a16="http://schemas.microsoft.com/office/drawing/2014/main" id="{46E40D59-DBD8-44B7-B8AB-620B4F8109E0}"/>
+                </a:ext>
+              </a:extLst>
+            </p:cNvPr>
+            <p:cNvGrpSpPr/>
+            <p:nvPr/>
+          </p:nvGrpSpPr>
+          <p:grpSpPr>
+            <a:xfrm>
+              <a:off x="1101012" y="1380932"/>
+              <a:ext cx="373224" cy="270586"/>
+              <a:chOff x="1101012" y="1380932"/>
+              <a:chExt cx="373224" cy="270586"/>
+            </a:xfrm>
+          </p:grpSpPr>
+          <p:cxnSp>
+            <p:nvCxnSpPr>
+              <p:cNvPr id="209" name="Gerader Verbinder 208">
+                <a:extLst>
+                  <a:ext uri="{FF2B5EF4-FFF2-40B4-BE49-F238E27FC236}">
+                    <a16:creationId xmlns:a16="http://schemas.microsoft.com/office/drawing/2014/main" id="{33164172-4C10-463B-8869-4638CDCA14D2}"/>
+                  </a:ext>
+                </a:extLst>
+              </p:cNvPr>
+              <p:cNvCxnSpPr>
+                <a:cxnSpLocks/>
+              </p:cNvCxnSpPr>
+              <p:nvPr/>
+            </p:nvCxnSpPr>
+            <p:spPr>
+              <a:xfrm>
+                <a:off x="1474236" y="1380932"/>
+                <a:ext cx="0" cy="270586"/>
+              </a:xfrm>
+              <a:prstGeom prst="line">
+                <a:avLst/>
+              </a:prstGeom>
+              <a:ln>
+                <a:solidFill>
+                  <a:schemeClr val="tx1"/>
+                </a:solidFill>
+              </a:ln>
+            </p:spPr>
+            <p:style>
+              <a:lnRef idx="1">
+                <a:schemeClr val="accent1"/>
+              </a:lnRef>
+              <a:fillRef idx="0">
+                <a:schemeClr val="accent1"/>
+              </a:fillRef>
+              <a:effectRef idx="0">
+                <a:schemeClr val="accent1"/>
+              </a:effectRef>
+              <a:fontRef idx="minor">
+                <a:schemeClr val="tx1"/>
+              </a:fontRef>
+            </p:style>
+          </p:cxnSp>
+          <p:cxnSp>
+            <p:nvCxnSpPr>
+              <p:cNvPr id="210" name="Gerader Verbinder 209">
+                <a:extLst>
+                  <a:ext uri="{FF2B5EF4-FFF2-40B4-BE49-F238E27FC236}">
+                    <a16:creationId xmlns:a16="http://schemas.microsoft.com/office/drawing/2014/main" id="{E766FEA0-133A-48A3-9E3F-4DEBF5A62EEF}"/>
+                  </a:ext>
+                </a:extLst>
+              </p:cNvPr>
+              <p:cNvCxnSpPr>
+                <a:cxnSpLocks/>
+              </p:cNvCxnSpPr>
+              <p:nvPr/>
+            </p:nvCxnSpPr>
+            <p:spPr>
+              <a:xfrm>
+                <a:off x="1101012" y="1651518"/>
+                <a:ext cx="373224" cy="0"/>
+              </a:xfrm>
+              <a:prstGeom prst="line">
+                <a:avLst/>
+              </a:prstGeom>
+              <a:ln>
+                <a:solidFill>
+                  <a:schemeClr val="tx1"/>
+                </a:solidFill>
+              </a:ln>
+            </p:spPr>
+            <p:style>
+              <a:lnRef idx="1">
+                <a:schemeClr val="accent1"/>
+              </a:lnRef>
+              <a:fillRef idx="0">
+                <a:schemeClr val="accent1"/>
+              </a:fillRef>
+              <a:effectRef idx="0">
+                <a:schemeClr val="accent1"/>
+              </a:effectRef>
+              <a:fontRef idx="minor">
+                <a:schemeClr val="tx1"/>
+              </a:fontRef>
+            </p:style>
+          </p:cxnSp>
+        </p:grpSp>
+      </p:grpSp>
+      <p:grpSp>
+        <p:nvGrpSpPr>
+          <p:cNvPr id="213" name="Gruppieren 212">
+            <a:extLst>
+              <a:ext uri="{FF2B5EF4-FFF2-40B4-BE49-F238E27FC236}">
+                <a16:creationId xmlns:a16="http://schemas.microsoft.com/office/drawing/2014/main" id="{CE9148D5-51FF-44A1-B217-12BDCD3CAB3E}"/>
+              </a:ext>
+            </a:extLst>
+          </p:cNvPr>
+          <p:cNvGrpSpPr/>
+          <p:nvPr/>
+        </p:nvGrpSpPr>
+        <p:grpSpPr>
+          <a:xfrm>
+            <a:off x="3771923" y="3491451"/>
+            <a:ext cx="1270129" cy="644606"/>
+            <a:chOff x="1101012" y="1380932"/>
+            <a:chExt cx="1651519" cy="886408"/>
+          </a:xfrm>
+        </p:grpSpPr>
+        <p:sp>
+          <p:nvSpPr>
+            <p:cNvPr id="214" name="Rechteck 213">
+              <a:extLst>
+                <a:ext uri="{FF2B5EF4-FFF2-40B4-BE49-F238E27FC236}">
+                  <a16:creationId xmlns:a16="http://schemas.microsoft.com/office/drawing/2014/main" id="{1B8A1A92-FA8A-4ADC-8B14-DAA22CE0421E}"/>
+                </a:ext>
+              </a:extLst>
+            </p:cNvPr>
+            <p:cNvSpPr/>
+            <p:nvPr/>
+          </p:nvSpPr>
+          <p:spPr>
+            <a:xfrm>
+              <a:off x="1101012" y="1380932"/>
+              <a:ext cx="1651519" cy="886408"/>
+            </a:xfrm>
+            <a:prstGeom prst="rect">
+              <a:avLst/>
+            </a:prstGeom>
+            <a:solidFill>
+              <a:schemeClr val="bg1"/>
+            </a:solidFill>
+            <a:ln>
+              <a:solidFill>
+                <a:schemeClr val="tx1"/>
+              </a:solidFill>
+            </a:ln>
+          </p:spPr>
+          <p:style>
+            <a:lnRef idx="2">
+              <a:schemeClr val="accent1">
+                <a:shade val="50000"/>
+              </a:schemeClr>
+            </a:lnRef>
+            <a:fillRef idx="1">
+              <a:schemeClr val="accent1"/>
+            </a:fillRef>
+            <a:effectRef idx="0">
+              <a:schemeClr val="accent1"/>
+            </a:effectRef>
+            <a:fontRef idx="minor">
+              <a:schemeClr val="lt1"/>
+            </a:fontRef>
+          </p:style>
+          <p:txBody>
+            <a:bodyPr rtlCol="0" anchor="ctr"/>
+            <a:lstStyle/>
+            <a:p>
+              <a:pPr algn="ctr"/>
+              <a:r>
+                <a:rPr lang="de-AT" sz="1600" dirty="0" err="1">
+                  <a:solidFill>
+                    <a:schemeClr val="tx1"/>
+                  </a:solidFill>
+                </a:rPr>
+                <a:t>Define</a:t>
+              </a:r>
+              <a:r>
+                <a:rPr lang="de-AT" sz="1600" dirty="0">
+                  <a:solidFill>
+                    <a:schemeClr val="tx1"/>
+                  </a:solidFill>
+                </a:rPr>
+                <a:t> API</a:t>
+              </a:r>
+            </a:p>
+          </p:txBody>
+        </p:sp>
+        <p:grpSp>
+          <p:nvGrpSpPr>
+            <p:cNvPr id="215" name="Gruppieren 214">
+              <a:extLst>
+                <a:ext uri="{FF2B5EF4-FFF2-40B4-BE49-F238E27FC236}">
+                  <a16:creationId xmlns:a16="http://schemas.microsoft.com/office/drawing/2014/main" id="{4C7B8D7D-F572-43C1-9180-5E2BCA384822}"/>
+                </a:ext>
+              </a:extLst>
+            </p:cNvPr>
+            <p:cNvGrpSpPr/>
+            <p:nvPr/>
+          </p:nvGrpSpPr>
+          <p:grpSpPr>
+            <a:xfrm>
+              <a:off x="2379306" y="1380932"/>
+              <a:ext cx="373224" cy="270586"/>
+              <a:chOff x="2379306" y="1380932"/>
+              <a:chExt cx="373224" cy="270586"/>
+            </a:xfrm>
+          </p:grpSpPr>
+          <p:cxnSp>
+            <p:nvCxnSpPr>
+              <p:cNvPr id="219" name="Gerader Verbinder 218">
+                <a:extLst>
+                  <a:ext uri="{FF2B5EF4-FFF2-40B4-BE49-F238E27FC236}">
+                    <a16:creationId xmlns:a16="http://schemas.microsoft.com/office/drawing/2014/main" id="{31D57048-4130-4EA0-A1EC-CDC5D3ABB517}"/>
+                  </a:ext>
+                </a:extLst>
+              </p:cNvPr>
+              <p:cNvCxnSpPr>
+                <a:cxnSpLocks/>
+              </p:cNvCxnSpPr>
+              <p:nvPr/>
+            </p:nvCxnSpPr>
+            <p:spPr>
+              <a:xfrm>
+                <a:off x="2379306" y="1380932"/>
+                <a:ext cx="0" cy="270586"/>
+              </a:xfrm>
+              <a:prstGeom prst="line">
+                <a:avLst/>
+              </a:prstGeom>
+              <a:ln>
+                <a:solidFill>
+                  <a:schemeClr val="tx1"/>
+                </a:solidFill>
+              </a:ln>
+            </p:spPr>
+            <p:style>
+              <a:lnRef idx="1">
+                <a:schemeClr val="accent1"/>
+              </a:lnRef>
+              <a:fillRef idx="0">
+                <a:schemeClr val="accent1"/>
+              </a:fillRef>
+              <a:effectRef idx="0">
+                <a:schemeClr val="accent1"/>
+              </a:effectRef>
+              <a:fontRef idx="minor">
+                <a:schemeClr val="tx1"/>
+              </a:fontRef>
+            </p:style>
+          </p:cxnSp>
+          <p:cxnSp>
+            <p:nvCxnSpPr>
+              <p:cNvPr id="220" name="Gerader Verbinder 219">
+                <a:extLst>
+                  <a:ext uri="{FF2B5EF4-FFF2-40B4-BE49-F238E27FC236}">
+                    <a16:creationId xmlns:a16="http://schemas.microsoft.com/office/drawing/2014/main" id="{9F65DC91-5C35-4379-BD27-442DB2E60D83}"/>
+                  </a:ext>
+                </a:extLst>
+              </p:cNvPr>
+              <p:cNvCxnSpPr>
+                <a:cxnSpLocks/>
+              </p:cNvCxnSpPr>
+              <p:nvPr/>
+            </p:nvCxnSpPr>
+            <p:spPr>
+              <a:xfrm>
+                <a:off x="2379306" y="1651518"/>
+                <a:ext cx="373224" cy="0"/>
+              </a:xfrm>
+              <a:prstGeom prst="line">
+                <a:avLst/>
+              </a:prstGeom>
+              <a:ln>
+                <a:solidFill>
+                  <a:schemeClr val="tx1"/>
+                </a:solidFill>
+              </a:ln>
+            </p:spPr>
+            <p:style>
+              <a:lnRef idx="1">
+                <a:schemeClr val="accent1"/>
+              </a:lnRef>
+              <a:fillRef idx="0">
+                <a:schemeClr val="accent1"/>
+              </a:fillRef>
+              <a:effectRef idx="0">
+                <a:schemeClr val="accent1"/>
+              </a:effectRef>
+              <a:fontRef idx="minor">
+                <a:schemeClr val="tx1"/>
+              </a:fontRef>
+            </p:style>
+          </p:cxnSp>
+        </p:grpSp>
+        <p:grpSp>
+          <p:nvGrpSpPr>
+            <p:cNvPr id="216" name="Gruppieren 215">
+              <a:extLst>
+                <a:ext uri="{FF2B5EF4-FFF2-40B4-BE49-F238E27FC236}">
+                  <a16:creationId xmlns:a16="http://schemas.microsoft.com/office/drawing/2014/main" id="{2E83C7A2-44AE-4F5D-863A-E6BD600A0DEB}"/>
+                </a:ext>
+              </a:extLst>
+            </p:cNvPr>
+            <p:cNvGrpSpPr/>
+            <p:nvPr/>
+          </p:nvGrpSpPr>
+          <p:grpSpPr>
+            <a:xfrm>
+              <a:off x="1101012" y="1380932"/>
+              <a:ext cx="373224" cy="270586"/>
+              <a:chOff x="1101012" y="1380932"/>
+              <a:chExt cx="373224" cy="270586"/>
+            </a:xfrm>
+          </p:grpSpPr>
+          <p:cxnSp>
+            <p:nvCxnSpPr>
+              <p:cNvPr id="217" name="Gerader Verbinder 216">
+                <a:extLst>
+                  <a:ext uri="{FF2B5EF4-FFF2-40B4-BE49-F238E27FC236}">
+                    <a16:creationId xmlns:a16="http://schemas.microsoft.com/office/drawing/2014/main" id="{D1EF9D84-DE42-460F-98F2-46C9D179DE92}"/>
+                  </a:ext>
+                </a:extLst>
+              </p:cNvPr>
+              <p:cNvCxnSpPr>
+                <a:cxnSpLocks/>
+              </p:cNvCxnSpPr>
+              <p:nvPr/>
+            </p:nvCxnSpPr>
+            <p:spPr>
+              <a:xfrm>
+                <a:off x="1474236" y="1380932"/>
+                <a:ext cx="0" cy="270586"/>
+              </a:xfrm>
+              <a:prstGeom prst="line">
+                <a:avLst/>
+              </a:prstGeom>
+              <a:ln>
+                <a:solidFill>
+                  <a:schemeClr val="tx1"/>
+                </a:solidFill>
+              </a:ln>
+            </p:spPr>
+            <p:style>
+              <a:lnRef idx="1">
+                <a:schemeClr val="accent1"/>
+              </a:lnRef>
+              <a:fillRef idx="0">
+                <a:schemeClr val="accent1"/>
+              </a:fillRef>
+              <a:effectRef idx="0">
+                <a:schemeClr val="accent1"/>
+              </a:effectRef>
+              <a:fontRef idx="minor">
+                <a:schemeClr val="tx1"/>
+              </a:fontRef>
+            </p:style>
+          </p:cxnSp>
+          <p:cxnSp>
+            <p:nvCxnSpPr>
+              <p:cNvPr id="218" name="Gerader Verbinder 217">
+                <a:extLst>
+                  <a:ext uri="{FF2B5EF4-FFF2-40B4-BE49-F238E27FC236}">
+                    <a16:creationId xmlns:a16="http://schemas.microsoft.com/office/drawing/2014/main" id="{69FFC408-DAAB-4DCE-A75D-CA015B6F19DB}"/>
+                  </a:ext>
+                </a:extLst>
+              </p:cNvPr>
+              <p:cNvCxnSpPr>
+                <a:cxnSpLocks/>
+              </p:cNvCxnSpPr>
+              <p:nvPr/>
+            </p:nvCxnSpPr>
+            <p:spPr>
+              <a:xfrm>
+                <a:off x="1101012" y="1651518"/>
+                <a:ext cx="373224" cy="0"/>
+              </a:xfrm>
+              <a:prstGeom prst="line">
+                <a:avLst/>
+              </a:prstGeom>
+              <a:ln>
+                <a:solidFill>
+                  <a:schemeClr val="tx1"/>
+                </a:solidFill>
+              </a:ln>
+            </p:spPr>
+            <p:style>
+              <a:lnRef idx="1">
+                <a:schemeClr val="accent1"/>
+              </a:lnRef>
+              <a:fillRef idx="0">
+                <a:schemeClr val="accent1"/>
+              </a:fillRef>
+              <a:effectRef idx="0">
+                <a:schemeClr val="accent1"/>
+              </a:effectRef>
+              <a:fontRef idx="minor">
+                <a:schemeClr val="tx1"/>
+              </a:fontRef>
+            </p:style>
+          </p:cxnSp>
+        </p:grpSp>
+      </p:grpSp>
+      <p:grpSp>
+        <p:nvGrpSpPr>
+          <p:cNvPr id="221" name="Gruppieren 220">
+            <a:extLst>
+              <a:ext uri="{FF2B5EF4-FFF2-40B4-BE49-F238E27FC236}">
+                <a16:creationId xmlns:a16="http://schemas.microsoft.com/office/drawing/2014/main" id="{271813CF-989D-4B2C-B195-7CCC26134A13}"/>
+              </a:ext>
+            </a:extLst>
+          </p:cNvPr>
+          <p:cNvGrpSpPr/>
+          <p:nvPr/>
+        </p:nvGrpSpPr>
+        <p:grpSpPr>
+          <a:xfrm>
+            <a:off x="3771923" y="4314466"/>
+            <a:ext cx="1270129" cy="644606"/>
+            <a:chOff x="1101012" y="1380932"/>
+            <a:chExt cx="1651519" cy="886408"/>
+          </a:xfrm>
+        </p:grpSpPr>
+        <p:sp>
+          <p:nvSpPr>
+            <p:cNvPr id="222" name="Rechteck 221">
+              <a:extLst>
+                <a:ext uri="{FF2B5EF4-FFF2-40B4-BE49-F238E27FC236}">
+                  <a16:creationId xmlns:a16="http://schemas.microsoft.com/office/drawing/2014/main" id="{0196658E-5BB3-4F47-A687-57D3E95D0044}"/>
+                </a:ext>
+              </a:extLst>
+            </p:cNvPr>
+            <p:cNvSpPr/>
+            <p:nvPr/>
+          </p:nvSpPr>
+          <p:spPr>
+            <a:xfrm>
+              <a:off x="1101012" y="1380932"/>
+              <a:ext cx="1651519" cy="886408"/>
+            </a:xfrm>
+            <a:prstGeom prst="rect">
+              <a:avLst/>
+            </a:prstGeom>
+            <a:solidFill>
+              <a:schemeClr val="bg1"/>
+            </a:solidFill>
+            <a:ln>
+              <a:solidFill>
+                <a:schemeClr val="tx1"/>
+              </a:solidFill>
+            </a:ln>
+          </p:spPr>
+          <p:style>
+            <a:lnRef idx="2">
+              <a:schemeClr val="accent1">
+                <a:shade val="50000"/>
+              </a:schemeClr>
+            </a:lnRef>
+            <a:fillRef idx="1">
+              <a:schemeClr val="accent1"/>
+            </a:fillRef>
+            <a:effectRef idx="0">
+              <a:schemeClr val="accent1"/>
+            </a:effectRef>
+            <a:fontRef idx="minor">
+              <a:schemeClr val="lt1"/>
+            </a:fontRef>
+          </p:style>
+          <p:txBody>
+            <a:bodyPr rtlCol="0" anchor="ctr"/>
+            <a:lstStyle/>
+            <a:p>
+              <a:pPr algn="ctr"/>
+              <a:r>
+                <a:rPr lang="de-AT" sz="1600" dirty="0" err="1">
+                  <a:solidFill>
+                    <a:schemeClr val="tx1"/>
+                  </a:solidFill>
+                </a:rPr>
+                <a:t>Define</a:t>
+              </a:r>
+              <a:r>
+                <a:rPr lang="de-AT" sz="1600" dirty="0">
+                  <a:solidFill>
+                    <a:schemeClr val="tx1"/>
+                  </a:solidFill>
+                </a:rPr>
+                <a:t> </a:t>
+              </a:r>
+              <a:r>
+                <a:rPr lang="de-AT" sz="1600" dirty="0" err="1">
+                  <a:solidFill>
+                    <a:schemeClr val="tx1"/>
+                  </a:solidFill>
+                </a:rPr>
+                <a:t>server</a:t>
+              </a:r>
+              <a:r>
+                <a:rPr lang="de-AT" sz="1600" dirty="0">
+                  <a:solidFill>
+                    <a:schemeClr val="tx1"/>
+                  </a:solidFill>
+                </a:rPr>
+                <a:t> </a:t>
+              </a:r>
+              <a:r>
+                <a:rPr lang="de-AT" sz="1600" dirty="0" err="1">
+                  <a:solidFill>
+                    <a:schemeClr val="tx1"/>
+                  </a:solidFill>
+                </a:rPr>
+                <a:t>config</a:t>
+              </a:r>
+              <a:endParaRPr lang="de-AT" sz="1600" dirty="0">
+                <a:solidFill>
+                  <a:schemeClr val="tx1"/>
+                </a:solidFill>
+              </a:endParaRPr>
+            </a:p>
+          </p:txBody>
+        </p:sp>
+        <p:grpSp>
+          <p:nvGrpSpPr>
+            <p:cNvPr id="223" name="Gruppieren 222">
+              <a:extLst>
+                <a:ext uri="{FF2B5EF4-FFF2-40B4-BE49-F238E27FC236}">
+                  <a16:creationId xmlns:a16="http://schemas.microsoft.com/office/drawing/2014/main" id="{1F460CB4-BB89-460F-BB4C-AB4F102D998B}"/>
+                </a:ext>
+              </a:extLst>
+            </p:cNvPr>
+            <p:cNvGrpSpPr/>
+            <p:nvPr/>
+          </p:nvGrpSpPr>
+          <p:grpSpPr>
+            <a:xfrm>
+              <a:off x="2379306" y="1380932"/>
+              <a:ext cx="373224" cy="270586"/>
+              <a:chOff x="2379306" y="1380932"/>
+              <a:chExt cx="373224" cy="270586"/>
+            </a:xfrm>
+          </p:grpSpPr>
+          <p:cxnSp>
+            <p:nvCxnSpPr>
+              <p:cNvPr id="227" name="Gerader Verbinder 226">
+                <a:extLst>
+                  <a:ext uri="{FF2B5EF4-FFF2-40B4-BE49-F238E27FC236}">
+                    <a16:creationId xmlns:a16="http://schemas.microsoft.com/office/drawing/2014/main" id="{BBEC1460-86A5-4D94-BEAD-322302B7C5C5}"/>
+                  </a:ext>
+                </a:extLst>
+              </p:cNvPr>
+              <p:cNvCxnSpPr>
+                <a:cxnSpLocks/>
+              </p:cNvCxnSpPr>
+              <p:nvPr/>
+            </p:nvCxnSpPr>
+            <p:spPr>
+              <a:xfrm>
+                <a:off x="2379306" y="1380932"/>
+                <a:ext cx="0" cy="270586"/>
+              </a:xfrm>
+              <a:prstGeom prst="line">
+                <a:avLst/>
+              </a:prstGeom>
+              <a:ln>
+                <a:solidFill>
+                  <a:schemeClr val="tx1"/>
+                </a:solidFill>
+              </a:ln>
+            </p:spPr>
+            <p:style>
+              <a:lnRef idx="1">
+                <a:schemeClr val="accent1"/>
+              </a:lnRef>
+              <a:fillRef idx="0">
+                <a:schemeClr val="accent1"/>
+              </a:fillRef>
+              <a:effectRef idx="0">
+                <a:schemeClr val="accent1"/>
+              </a:effectRef>
+              <a:fontRef idx="minor">
+                <a:schemeClr val="tx1"/>
+              </a:fontRef>
+            </p:style>
+          </p:cxnSp>
+          <p:cxnSp>
+            <p:nvCxnSpPr>
+              <p:cNvPr id="228" name="Gerader Verbinder 227">
+                <a:extLst>
+                  <a:ext uri="{FF2B5EF4-FFF2-40B4-BE49-F238E27FC236}">
+                    <a16:creationId xmlns:a16="http://schemas.microsoft.com/office/drawing/2014/main" id="{D670966E-720B-4944-951E-E1197B59B30C}"/>
+                  </a:ext>
+                </a:extLst>
+              </p:cNvPr>
+              <p:cNvCxnSpPr>
+                <a:cxnSpLocks/>
+              </p:cNvCxnSpPr>
+              <p:nvPr/>
+            </p:nvCxnSpPr>
+            <p:spPr>
+              <a:xfrm>
+                <a:off x="2379306" y="1651518"/>
+                <a:ext cx="373224" cy="0"/>
+              </a:xfrm>
+              <a:prstGeom prst="line">
+                <a:avLst/>
+              </a:prstGeom>
+              <a:ln>
+                <a:solidFill>
+                  <a:schemeClr val="tx1"/>
+                </a:solidFill>
+              </a:ln>
+            </p:spPr>
+            <p:style>
+              <a:lnRef idx="1">
+                <a:schemeClr val="accent1"/>
+              </a:lnRef>
+              <a:fillRef idx="0">
+                <a:schemeClr val="accent1"/>
+              </a:fillRef>
+              <a:effectRef idx="0">
+                <a:schemeClr val="accent1"/>
+              </a:effectRef>
+              <a:fontRef idx="minor">
+                <a:schemeClr val="tx1"/>
+              </a:fontRef>
+            </p:style>
+          </p:cxnSp>
+        </p:grpSp>
+        <p:grpSp>
+          <p:nvGrpSpPr>
+            <p:cNvPr id="224" name="Gruppieren 223">
+              <a:extLst>
+                <a:ext uri="{FF2B5EF4-FFF2-40B4-BE49-F238E27FC236}">
+                  <a16:creationId xmlns:a16="http://schemas.microsoft.com/office/drawing/2014/main" id="{6C332F38-5378-4468-A06D-EB4DD0C1167B}"/>
+                </a:ext>
+              </a:extLst>
+            </p:cNvPr>
+            <p:cNvGrpSpPr/>
+            <p:nvPr/>
+          </p:nvGrpSpPr>
+          <p:grpSpPr>
+            <a:xfrm>
+              <a:off x="1101012" y="1380932"/>
+              <a:ext cx="373224" cy="270586"/>
+              <a:chOff x="1101012" y="1380932"/>
+              <a:chExt cx="373224" cy="270586"/>
+            </a:xfrm>
+          </p:grpSpPr>
+          <p:cxnSp>
+            <p:nvCxnSpPr>
+              <p:cNvPr id="225" name="Gerader Verbinder 224">
+                <a:extLst>
+                  <a:ext uri="{FF2B5EF4-FFF2-40B4-BE49-F238E27FC236}">
+                    <a16:creationId xmlns:a16="http://schemas.microsoft.com/office/drawing/2014/main" id="{A685F352-1E78-476F-8C62-346BA89164AF}"/>
+                  </a:ext>
+                </a:extLst>
+              </p:cNvPr>
+              <p:cNvCxnSpPr>
+                <a:cxnSpLocks/>
+              </p:cNvCxnSpPr>
+              <p:nvPr/>
+            </p:nvCxnSpPr>
+            <p:spPr>
+              <a:xfrm>
+                <a:off x="1474236" y="1380932"/>
+                <a:ext cx="0" cy="270586"/>
+              </a:xfrm>
+              <a:prstGeom prst="line">
+                <a:avLst/>
+              </a:prstGeom>
+              <a:ln>
+                <a:solidFill>
+                  <a:schemeClr val="tx1"/>
+                </a:solidFill>
+              </a:ln>
+            </p:spPr>
+            <p:style>
+              <a:lnRef idx="1">
+                <a:schemeClr val="accent1"/>
+              </a:lnRef>
+              <a:fillRef idx="0">
+                <a:schemeClr val="accent1"/>
+              </a:fillRef>
+              <a:effectRef idx="0">
+                <a:schemeClr val="accent1"/>
+              </a:effectRef>
+              <a:fontRef idx="minor">
+                <a:schemeClr val="tx1"/>
+              </a:fontRef>
+            </p:style>
+          </p:cxnSp>
+          <p:cxnSp>
+            <p:nvCxnSpPr>
+              <p:cNvPr id="226" name="Gerader Verbinder 225">
+                <a:extLst>
+                  <a:ext uri="{FF2B5EF4-FFF2-40B4-BE49-F238E27FC236}">
+                    <a16:creationId xmlns:a16="http://schemas.microsoft.com/office/drawing/2014/main" id="{22BC9B94-505E-4710-8C21-81A1A4611C58}"/>
+                  </a:ext>
+                </a:extLst>
+              </p:cNvPr>
+              <p:cNvCxnSpPr>
+                <a:cxnSpLocks/>
+              </p:cNvCxnSpPr>
+              <p:nvPr/>
+            </p:nvCxnSpPr>
+            <p:spPr>
+              <a:xfrm>
+                <a:off x="1101012" y="1651518"/>
+                <a:ext cx="373224" cy="0"/>
+              </a:xfrm>
+              <a:prstGeom prst="line">
+                <a:avLst/>
+              </a:prstGeom>
+              <a:ln>
+                <a:solidFill>
+                  <a:schemeClr val="tx1"/>
+                </a:solidFill>
+              </a:ln>
+            </p:spPr>
+            <p:style>
+              <a:lnRef idx="1">
+                <a:schemeClr val="accent1"/>
+              </a:lnRef>
+              <a:fillRef idx="0">
+                <a:schemeClr val="accent1"/>
+              </a:fillRef>
+              <a:effectRef idx="0">
+                <a:schemeClr val="accent1"/>
+              </a:effectRef>
+              <a:fontRef idx="minor">
+                <a:schemeClr val="tx1"/>
+              </a:fontRef>
+            </p:style>
+          </p:cxnSp>
+        </p:grpSp>
+      </p:grpSp>
+      <p:grpSp>
+        <p:nvGrpSpPr>
+          <p:cNvPr id="229" name="Gruppieren 228">
+            <a:extLst>
+              <a:ext uri="{FF2B5EF4-FFF2-40B4-BE49-F238E27FC236}">
+                <a16:creationId xmlns:a16="http://schemas.microsoft.com/office/drawing/2014/main" id="{C6364DEA-B16D-4D64-908E-CC6E3E6BC02A}"/>
+              </a:ext>
+            </a:extLst>
+          </p:cNvPr>
+          <p:cNvGrpSpPr/>
+          <p:nvPr/>
+        </p:nvGrpSpPr>
+        <p:grpSpPr>
+          <a:xfrm>
+            <a:off x="3775984" y="5110744"/>
+            <a:ext cx="1270129" cy="644606"/>
+            <a:chOff x="1101012" y="1380932"/>
+            <a:chExt cx="1651519" cy="886408"/>
+          </a:xfrm>
+        </p:grpSpPr>
+        <p:sp>
+          <p:nvSpPr>
+            <p:cNvPr id="230" name="Rechteck 229">
+              <a:extLst>
+                <a:ext uri="{FF2B5EF4-FFF2-40B4-BE49-F238E27FC236}">
+                  <a16:creationId xmlns:a16="http://schemas.microsoft.com/office/drawing/2014/main" id="{6135A554-45E4-438B-B35A-8F72C35F3ED1}"/>
+                </a:ext>
+              </a:extLst>
+            </p:cNvPr>
+            <p:cNvSpPr/>
+            <p:nvPr/>
+          </p:nvSpPr>
+          <p:spPr>
+            <a:xfrm>
+              <a:off x="1101012" y="1380932"/>
+              <a:ext cx="1651519" cy="886408"/>
+            </a:xfrm>
+            <a:prstGeom prst="rect">
+              <a:avLst/>
+            </a:prstGeom>
+            <a:solidFill>
+              <a:schemeClr val="bg1"/>
+            </a:solidFill>
+            <a:ln>
+              <a:solidFill>
+                <a:schemeClr val="tx1"/>
+              </a:solidFill>
+            </a:ln>
+          </p:spPr>
+          <p:style>
+            <a:lnRef idx="2">
+              <a:schemeClr val="accent1">
+                <a:shade val="50000"/>
+              </a:schemeClr>
+            </a:lnRef>
+            <a:fillRef idx="1">
+              <a:schemeClr val="accent1"/>
+            </a:fillRef>
+            <a:effectRef idx="0">
+              <a:schemeClr val="accent1"/>
+            </a:effectRef>
+            <a:fontRef idx="minor">
+              <a:schemeClr val="lt1"/>
+            </a:fontRef>
+          </p:style>
+          <p:txBody>
+            <a:bodyPr rtlCol="0" anchor="ctr"/>
+            <a:lstStyle/>
+            <a:p>
+              <a:pPr algn="ctr"/>
+              <a:r>
+                <a:rPr lang="de-AT" sz="1600" dirty="0" err="1">
+                  <a:solidFill>
+                    <a:schemeClr val="tx1"/>
+                  </a:solidFill>
+                </a:rPr>
+                <a:t>Define</a:t>
+              </a:r>
+              <a:r>
+                <a:rPr lang="de-AT" sz="1600" dirty="0">
+                  <a:solidFill>
+                    <a:schemeClr val="tx1"/>
+                  </a:solidFill>
+                </a:rPr>
+                <a:t> </a:t>
+              </a:r>
+              <a:r>
+                <a:rPr lang="de-AT" sz="1600" dirty="0" err="1">
+                  <a:solidFill>
+                    <a:schemeClr val="tx1"/>
+                  </a:solidFill>
+                </a:rPr>
+                <a:t>testcases</a:t>
+              </a:r>
+              <a:endParaRPr lang="de-AT" sz="1600" dirty="0">
+                <a:solidFill>
+                  <a:schemeClr val="tx1"/>
+                </a:solidFill>
+              </a:endParaRPr>
+            </a:p>
+          </p:txBody>
+        </p:sp>
+        <p:grpSp>
+          <p:nvGrpSpPr>
+            <p:cNvPr id="231" name="Gruppieren 230">
+              <a:extLst>
+                <a:ext uri="{FF2B5EF4-FFF2-40B4-BE49-F238E27FC236}">
+                  <a16:creationId xmlns:a16="http://schemas.microsoft.com/office/drawing/2014/main" id="{7846AFA1-BEF6-4831-9C39-CCD407BC429A}"/>
+                </a:ext>
+              </a:extLst>
+            </p:cNvPr>
+            <p:cNvGrpSpPr/>
+            <p:nvPr/>
+          </p:nvGrpSpPr>
+          <p:grpSpPr>
+            <a:xfrm>
+              <a:off x="2379306" y="1380932"/>
+              <a:ext cx="373224" cy="270586"/>
+              <a:chOff x="2379306" y="1380932"/>
+              <a:chExt cx="373224" cy="270586"/>
+            </a:xfrm>
+          </p:grpSpPr>
+          <p:cxnSp>
+            <p:nvCxnSpPr>
+              <p:cNvPr id="235" name="Gerader Verbinder 234">
+                <a:extLst>
+                  <a:ext uri="{FF2B5EF4-FFF2-40B4-BE49-F238E27FC236}">
+                    <a16:creationId xmlns:a16="http://schemas.microsoft.com/office/drawing/2014/main" id="{A4BC3B45-709B-4A9F-B47A-93C3F66E3EA4}"/>
+                  </a:ext>
+                </a:extLst>
+              </p:cNvPr>
+              <p:cNvCxnSpPr>
+                <a:cxnSpLocks/>
+              </p:cNvCxnSpPr>
+              <p:nvPr/>
+            </p:nvCxnSpPr>
+            <p:spPr>
+              <a:xfrm>
+                <a:off x="2379306" y="1380932"/>
+                <a:ext cx="0" cy="270586"/>
+              </a:xfrm>
+              <a:prstGeom prst="line">
+                <a:avLst/>
+              </a:prstGeom>
+              <a:ln>
+                <a:solidFill>
+                  <a:schemeClr val="tx1"/>
+                </a:solidFill>
+              </a:ln>
+            </p:spPr>
+            <p:style>
+              <a:lnRef idx="1">
+                <a:schemeClr val="accent1"/>
+              </a:lnRef>
+              <a:fillRef idx="0">
+                <a:schemeClr val="accent1"/>
+              </a:fillRef>
+              <a:effectRef idx="0">
+                <a:schemeClr val="accent1"/>
+              </a:effectRef>
+              <a:fontRef idx="minor">
+                <a:schemeClr val="tx1"/>
+              </a:fontRef>
+            </p:style>
+          </p:cxnSp>
+          <p:cxnSp>
+            <p:nvCxnSpPr>
+              <p:cNvPr id="236" name="Gerader Verbinder 235">
+                <a:extLst>
+                  <a:ext uri="{FF2B5EF4-FFF2-40B4-BE49-F238E27FC236}">
+                    <a16:creationId xmlns:a16="http://schemas.microsoft.com/office/drawing/2014/main" id="{D05B43FA-3CD5-4BBE-924C-F865D635A10C}"/>
+                  </a:ext>
+                </a:extLst>
+              </p:cNvPr>
+              <p:cNvCxnSpPr>
+                <a:cxnSpLocks/>
+              </p:cNvCxnSpPr>
+              <p:nvPr/>
+            </p:nvCxnSpPr>
+            <p:spPr>
+              <a:xfrm>
+                <a:off x="2379306" y="1651518"/>
+                <a:ext cx="373224" cy="0"/>
+              </a:xfrm>
+              <a:prstGeom prst="line">
+                <a:avLst/>
+              </a:prstGeom>
+              <a:ln>
+                <a:solidFill>
+                  <a:schemeClr val="tx1"/>
+                </a:solidFill>
+              </a:ln>
+            </p:spPr>
+            <p:style>
+              <a:lnRef idx="1">
+                <a:schemeClr val="accent1"/>
+              </a:lnRef>
+              <a:fillRef idx="0">
+                <a:schemeClr val="accent1"/>
+              </a:fillRef>
+              <a:effectRef idx="0">
+                <a:schemeClr val="accent1"/>
+              </a:effectRef>
+              <a:fontRef idx="minor">
+                <a:schemeClr val="tx1"/>
+              </a:fontRef>
+            </p:style>
+          </p:cxnSp>
+        </p:grpSp>
+        <p:grpSp>
+          <p:nvGrpSpPr>
+            <p:cNvPr id="232" name="Gruppieren 231">
+              <a:extLst>
+                <a:ext uri="{FF2B5EF4-FFF2-40B4-BE49-F238E27FC236}">
+                  <a16:creationId xmlns:a16="http://schemas.microsoft.com/office/drawing/2014/main" id="{EEFC9B3F-A8AC-4C18-9C7C-027140C795BC}"/>
+                </a:ext>
+              </a:extLst>
+            </p:cNvPr>
+            <p:cNvGrpSpPr/>
+            <p:nvPr/>
+          </p:nvGrpSpPr>
+          <p:grpSpPr>
+            <a:xfrm>
+              <a:off x="1101012" y="1380932"/>
+              <a:ext cx="373224" cy="270586"/>
+              <a:chOff x="1101012" y="1380932"/>
+              <a:chExt cx="373224" cy="270586"/>
+            </a:xfrm>
+          </p:grpSpPr>
+          <p:cxnSp>
+            <p:nvCxnSpPr>
+              <p:cNvPr id="233" name="Gerader Verbinder 232">
+                <a:extLst>
+                  <a:ext uri="{FF2B5EF4-FFF2-40B4-BE49-F238E27FC236}">
+                    <a16:creationId xmlns:a16="http://schemas.microsoft.com/office/drawing/2014/main" id="{04484FAF-4AF6-4DC3-A1EE-B67F0563B6D1}"/>
+                  </a:ext>
+                </a:extLst>
+              </p:cNvPr>
+              <p:cNvCxnSpPr>
+                <a:cxnSpLocks/>
+              </p:cNvCxnSpPr>
+              <p:nvPr/>
+            </p:nvCxnSpPr>
+            <p:spPr>
+              <a:xfrm>
+                <a:off x="1474236" y="1380932"/>
+                <a:ext cx="0" cy="270586"/>
+              </a:xfrm>
+              <a:prstGeom prst="line">
+                <a:avLst/>
+              </a:prstGeom>
+              <a:ln>
+                <a:solidFill>
+                  <a:schemeClr val="tx1"/>
+                </a:solidFill>
+              </a:ln>
+            </p:spPr>
+            <p:style>
+              <a:lnRef idx="1">
+                <a:schemeClr val="accent1"/>
+              </a:lnRef>
+              <a:fillRef idx="0">
+                <a:schemeClr val="accent1"/>
+              </a:fillRef>
+              <a:effectRef idx="0">
+                <a:schemeClr val="accent1"/>
+              </a:effectRef>
+              <a:fontRef idx="minor">
+                <a:schemeClr val="tx1"/>
+              </a:fontRef>
+            </p:style>
+          </p:cxnSp>
+          <p:cxnSp>
+            <p:nvCxnSpPr>
+              <p:cNvPr id="234" name="Gerader Verbinder 233">
+                <a:extLst>
+                  <a:ext uri="{FF2B5EF4-FFF2-40B4-BE49-F238E27FC236}">
+                    <a16:creationId xmlns:a16="http://schemas.microsoft.com/office/drawing/2014/main" id="{88BB9A20-1187-43C3-9E74-BE812B2C0FE6}"/>
+                  </a:ext>
+                </a:extLst>
+              </p:cNvPr>
+              <p:cNvCxnSpPr>
+                <a:cxnSpLocks/>
+              </p:cNvCxnSpPr>
+              <p:nvPr/>
+            </p:nvCxnSpPr>
+            <p:spPr>
+              <a:xfrm>
+                <a:off x="1101012" y="1651518"/>
+                <a:ext cx="373224" cy="0"/>
+              </a:xfrm>
+              <a:prstGeom prst="line">
+                <a:avLst/>
+              </a:prstGeom>
+              <a:ln>
+                <a:solidFill>
+                  <a:schemeClr val="tx1"/>
+                </a:solidFill>
+              </a:ln>
+            </p:spPr>
+            <p:style>
+              <a:lnRef idx="1">
+                <a:schemeClr val="accent1"/>
+              </a:lnRef>
+              <a:fillRef idx="0">
+                <a:schemeClr val="accent1"/>
+              </a:fillRef>
+              <a:effectRef idx="0">
+                <a:schemeClr val="accent1"/>
+              </a:effectRef>
+              <a:fontRef idx="minor">
+                <a:schemeClr val="tx1"/>
+              </a:fontRef>
+            </p:style>
+          </p:cxnSp>
+        </p:grpSp>
+      </p:grpSp>
+      <p:sp>
+        <p:nvSpPr>
+          <p:cNvPr id="237" name="Textfeld 236">
+            <a:extLst>
+              <a:ext uri="{FF2B5EF4-FFF2-40B4-BE49-F238E27FC236}">
+                <a16:creationId xmlns:a16="http://schemas.microsoft.com/office/drawing/2014/main" id="{3BE17701-3A4B-43E5-91A8-C37D62B9B770}"/>
+              </a:ext>
+            </a:extLst>
+          </p:cNvPr>
+          <p:cNvSpPr txBox="1"/>
+          <p:nvPr/>
+        </p:nvSpPr>
+        <p:spPr>
+          <a:xfrm>
+            <a:off x="3721755" y="1844918"/>
+            <a:ext cx="604408" cy="307777"/>
+          </a:xfrm>
+          <a:prstGeom prst="rect">
+            <a:avLst/>
+          </a:prstGeom>
+          <a:noFill/>
+        </p:spPr>
+        <p:txBody>
+          <a:bodyPr wrap="square" rtlCol="0">
+            <a:spAutoFit/>
+          </a:bodyPr>
+          <a:lstStyle/>
+          <a:p>
+            <a:r>
+              <a:rPr lang="de-AT" sz="1400" dirty="0"/>
+              <a:t>3.1 </a:t>
+            </a:r>
+          </a:p>
+        </p:txBody>
+      </p:sp>
+      <p:sp>
+        <p:nvSpPr>
+          <p:cNvPr id="238" name="Textfeld 237">
+            <a:extLst>
+              <a:ext uri="{FF2B5EF4-FFF2-40B4-BE49-F238E27FC236}">
+                <a16:creationId xmlns:a16="http://schemas.microsoft.com/office/drawing/2014/main" id="{61651BCD-9BA4-499D-9550-B37563266818}"/>
+              </a:ext>
+            </a:extLst>
+          </p:cNvPr>
+          <p:cNvSpPr txBox="1"/>
+          <p:nvPr/>
+        </p:nvSpPr>
+        <p:spPr>
+          <a:xfrm>
+            <a:off x="3722296" y="2628275"/>
+            <a:ext cx="604408" cy="307777"/>
+          </a:xfrm>
+          <a:prstGeom prst="rect">
+            <a:avLst/>
+          </a:prstGeom>
+          <a:noFill/>
+        </p:spPr>
+        <p:txBody>
+          <a:bodyPr wrap="square" rtlCol="0">
+            <a:spAutoFit/>
+          </a:bodyPr>
+          <a:lstStyle/>
+          <a:p>
+            <a:r>
+              <a:rPr lang="de-AT" sz="1400" dirty="0"/>
+              <a:t>3.2 </a:t>
+            </a:r>
+          </a:p>
+        </p:txBody>
+      </p:sp>
+      <p:sp>
+        <p:nvSpPr>
+          <p:cNvPr id="239" name="Textfeld 238">
+            <a:extLst>
+              <a:ext uri="{FF2B5EF4-FFF2-40B4-BE49-F238E27FC236}">
+                <a16:creationId xmlns:a16="http://schemas.microsoft.com/office/drawing/2014/main" id="{832F3BD7-087A-4D18-BA56-BC06543F221D}"/>
+              </a:ext>
+            </a:extLst>
+          </p:cNvPr>
+          <p:cNvSpPr txBox="1"/>
+          <p:nvPr/>
+        </p:nvSpPr>
+        <p:spPr>
+          <a:xfrm>
+            <a:off x="3716027" y="3435013"/>
+            <a:ext cx="604408" cy="307777"/>
+          </a:xfrm>
+          <a:prstGeom prst="rect">
+            <a:avLst/>
+          </a:prstGeom>
+          <a:noFill/>
+        </p:spPr>
+        <p:txBody>
+          <a:bodyPr wrap="square" rtlCol="0">
+            <a:spAutoFit/>
+          </a:bodyPr>
+          <a:lstStyle/>
+          <a:p>
+            <a:r>
+              <a:rPr lang="de-AT" sz="1400" dirty="0"/>
+              <a:t>3.3 </a:t>
+            </a:r>
+          </a:p>
+        </p:txBody>
+      </p:sp>
+      <p:sp>
+        <p:nvSpPr>
+          <p:cNvPr id="240" name="Textfeld 239">
+            <a:extLst>
+              <a:ext uri="{FF2B5EF4-FFF2-40B4-BE49-F238E27FC236}">
+                <a16:creationId xmlns:a16="http://schemas.microsoft.com/office/drawing/2014/main" id="{E936B428-B813-4486-8B0A-1D2C3677ECFF}"/>
+              </a:ext>
+            </a:extLst>
+          </p:cNvPr>
+          <p:cNvSpPr txBox="1"/>
+          <p:nvPr/>
+        </p:nvSpPr>
+        <p:spPr>
+          <a:xfrm>
+            <a:off x="3716027" y="4257464"/>
+            <a:ext cx="604408" cy="307777"/>
+          </a:xfrm>
+          <a:prstGeom prst="rect">
+            <a:avLst/>
+          </a:prstGeom>
+          <a:noFill/>
+        </p:spPr>
+        <p:txBody>
+          <a:bodyPr wrap="square" rtlCol="0">
+            <a:spAutoFit/>
+          </a:bodyPr>
+          <a:lstStyle/>
+          <a:p>
+            <a:r>
+              <a:rPr lang="de-AT" sz="1400" dirty="0"/>
+              <a:t>3.4 </a:t>
+            </a:r>
+          </a:p>
+        </p:txBody>
+      </p:sp>
+      <p:sp>
+        <p:nvSpPr>
+          <p:cNvPr id="241" name="Textfeld 240">
+            <a:extLst>
+              <a:ext uri="{FF2B5EF4-FFF2-40B4-BE49-F238E27FC236}">
+                <a16:creationId xmlns:a16="http://schemas.microsoft.com/office/drawing/2014/main" id="{D8596326-97C7-4A08-9564-B2A9E0945BB3}"/>
+              </a:ext>
+            </a:extLst>
+          </p:cNvPr>
+          <p:cNvSpPr txBox="1"/>
+          <p:nvPr/>
+        </p:nvSpPr>
+        <p:spPr>
+          <a:xfrm>
+            <a:off x="3724228" y="5051662"/>
+            <a:ext cx="604408" cy="307777"/>
+          </a:xfrm>
+          <a:prstGeom prst="rect">
+            <a:avLst/>
+          </a:prstGeom>
+          <a:noFill/>
+        </p:spPr>
+        <p:txBody>
+          <a:bodyPr wrap="square" rtlCol="0">
+            <a:spAutoFit/>
+          </a:bodyPr>
+          <a:lstStyle/>
+          <a:p>
+            <a:r>
+              <a:rPr lang="de-AT" sz="1400" dirty="0"/>
+              <a:t>3.5 </a:t>
+            </a:r>
+          </a:p>
+        </p:txBody>
+      </p:sp>
+      <p:cxnSp>
+        <p:nvCxnSpPr>
+          <p:cNvPr id="242" name="Gerader Verbinder 241">
+            <a:extLst>
+              <a:ext uri="{FF2B5EF4-FFF2-40B4-BE49-F238E27FC236}">
+                <a16:creationId xmlns:a16="http://schemas.microsoft.com/office/drawing/2014/main" id="{7D374C99-B992-44C8-9F0E-D04FE631B51A}"/>
+              </a:ext>
+            </a:extLst>
+          </p:cNvPr>
+          <p:cNvCxnSpPr>
+            <a:cxnSpLocks/>
+            <a:stCxn id="198" idx="2"/>
+            <a:endCxn id="206" idx="0"/>
+          </p:cNvCxnSpPr>
+          <p:nvPr/>
+        </p:nvCxnSpPr>
+        <p:spPr>
+          <a:xfrm>
+            <a:off x="4407637" y="2541280"/>
+            <a:ext cx="0" cy="132689"/>
+          </a:xfrm>
+          <a:prstGeom prst="line">
+            <a:avLst/>
+          </a:prstGeom>
+          <a:ln>
+            <a:solidFill>
+              <a:schemeClr val="tx1"/>
+            </a:solidFill>
+          </a:ln>
+        </p:spPr>
+        <p:style>
+          <a:lnRef idx="1">
+            <a:schemeClr val="accent1"/>
+          </a:lnRef>
+          <a:fillRef idx="0">
+            <a:schemeClr val="accent1"/>
+          </a:fillRef>
+          <a:effectRef idx="0">
+            <a:schemeClr val="accent1"/>
+          </a:effectRef>
+          <a:fontRef idx="minor">
+            <a:schemeClr val="tx1"/>
+          </a:fontRef>
+        </p:style>
+      </p:cxnSp>
+      <p:cxnSp>
+        <p:nvCxnSpPr>
+          <p:cNvPr id="243" name="Gerader Verbinder 242">
+            <a:extLst>
+              <a:ext uri="{FF2B5EF4-FFF2-40B4-BE49-F238E27FC236}">
+                <a16:creationId xmlns:a16="http://schemas.microsoft.com/office/drawing/2014/main" id="{34A72D4E-D03B-4669-A12F-6C5F4CFABA74}"/>
+              </a:ext>
+            </a:extLst>
+          </p:cNvPr>
+          <p:cNvCxnSpPr>
+            <a:cxnSpLocks/>
+            <a:stCxn id="206" idx="2"/>
+            <a:endCxn id="214" idx="0"/>
+          </p:cNvCxnSpPr>
+          <p:nvPr/>
+        </p:nvCxnSpPr>
+        <p:spPr>
+          <a:xfrm flipH="1">
+            <a:off x="4406988" y="3318575"/>
+            <a:ext cx="649" cy="172876"/>
+          </a:xfrm>
+          <a:prstGeom prst="line">
+            <a:avLst/>
+          </a:prstGeom>
+          <a:ln>
+            <a:solidFill>
+              <a:schemeClr val="tx1"/>
+            </a:solidFill>
+          </a:ln>
+        </p:spPr>
+        <p:style>
+          <a:lnRef idx="1">
+            <a:schemeClr val="accent1"/>
+          </a:lnRef>
+          <a:fillRef idx="0">
+            <a:schemeClr val="accent1"/>
+          </a:fillRef>
+          <a:effectRef idx="0">
+            <a:schemeClr val="accent1"/>
+          </a:effectRef>
+          <a:fontRef idx="minor">
+            <a:schemeClr val="tx1"/>
+          </a:fontRef>
+        </p:style>
+      </p:cxnSp>
+      <p:cxnSp>
+        <p:nvCxnSpPr>
+          <p:cNvPr id="244" name="Gerader Verbinder 243">
+            <a:extLst>
+              <a:ext uri="{FF2B5EF4-FFF2-40B4-BE49-F238E27FC236}">
+                <a16:creationId xmlns:a16="http://schemas.microsoft.com/office/drawing/2014/main" id="{91061095-DED1-4A1B-94FD-B8AE1301043A}"/>
+              </a:ext>
+            </a:extLst>
+          </p:cNvPr>
+          <p:cNvCxnSpPr>
+            <a:cxnSpLocks/>
+            <a:stCxn id="214" idx="2"/>
+            <a:endCxn id="222" idx="0"/>
+          </p:cNvCxnSpPr>
+          <p:nvPr/>
+        </p:nvCxnSpPr>
+        <p:spPr>
+          <a:xfrm>
+            <a:off x="4406988" y="4136057"/>
+            <a:ext cx="0" cy="178409"/>
+          </a:xfrm>
+          <a:prstGeom prst="line">
+            <a:avLst/>
+          </a:prstGeom>
+          <a:ln>
+            <a:solidFill>
+              <a:schemeClr val="tx1"/>
+            </a:solidFill>
+          </a:ln>
+        </p:spPr>
+        <p:style>
+          <a:lnRef idx="1">
+            <a:schemeClr val="accent1"/>
+          </a:lnRef>
+          <a:fillRef idx="0">
+            <a:schemeClr val="accent1"/>
+          </a:fillRef>
+          <a:effectRef idx="0">
+            <a:schemeClr val="accent1"/>
+          </a:effectRef>
+          <a:fontRef idx="minor">
+            <a:schemeClr val="tx1"/>
+          </a:fontRef>
+        </p:style>
+      </p:cxnSp>
+      <p:cxnSp>
+        <p:nvCxnSpPr>
+          <p:cNvPr id="245" name="Gerader Verbinder 244">
+            <a:extLst>
+              <a:ext uri="{FF2B5EF4-FFF2-40B4-BE49-F238E27FC236}">
+                <a16:creationId xmlns:a16="http://schemas.microsoft.com/office/drawing/2014/main" id="{8CA6947F-936A-40F1-B4D3-D9617B6AFFE6}"/>
+              </a:ext>
+            </a:extLst>
+          </p:cNvPr>
+          <p:cNvCxnSpPr>
+            <a:cxnSpLocks/>
+            <a:stCxn id="230" idx="0"/>
+            <a:endCxn id="222" idx="2"/>
+          </p:cNvCxnSpPr>
+          <p:nvPr/>
+        </p:nvCxnSpPr>
+        <p:spPr>
+          <a:xfrm flipH="1" flipV="1">
+            <a:off x="4406988" y="4959072"/>
+            <a:ext cx="4061" cy="151672"/>
+          </a:xfrm>
+          <a:prstGeom prst="line">
+            <a:avLst/>
+          </a:prstGeom>
+          <a:ln>
+            <a:solidFill>
+              <a:schemeClr val="tx1"/>
+            </a:solidFill>
+          </a:ln>
+        </p:spPr>
+        <p:style>
+          <a:lnRef idx="1">
+            <a:schemeClr val="accent1"/>
+          </a:lnRef>
+          <a:fillRef idx="0">
+            <a:schemeClr val="accent1"/>
+          </a:fillRef>
+          <a:effectRef idx="0">
+            <a:schemeClr val="accent1"/>
+          </a:effectRef>
+          <a:fontRef idx="minor">
+            <a:schemeClr val="tx1"/>
+          </a:fontRef>
+        </p:style>
+      </p:cxnSp>
+      <p:grpSp>
+        <p:nvGrpSpPr>
+          <p:cNvPr id="247" name="Gruppieren 246">
+            <a:extLst>
+              <a:ext uri="{FF2B5EF4-FFF2-40B4-BE49-F238E27FC236}">
+                <a16:creationId xmlns:a16="http://schemas.microsoft.com/office/drawing/2014/main" id="{BE36579C-787F-4972-9A02-2CC88FF9CE74}"/>
+              </a:ext>
+            </a:extLst>
+          </p:cNvPr>
+          <p:cNvGrpSpPr/>
+          <p:nvPr/>
+        </p:nvGrpSpPr>
+        <p:grpSpPr>
+          <a:xfrm>
+            <a:off x="3797850" y="5764251"/>
+            <a:ext cx="1270129" cy="1001222"/>
+            <a:chOff x="1205964" y="4197836"/>
+            <a:chExt cx="1270129" cy="1001222"/>
+          </a:xfrm>
+        </p:grpSpPr>
+        <p:grpSp>
+          <p:nvGrpSpPr>
+            <p:cNvPr id="248" name="Gruppieren 247">
+              <a:extLst>
+                <a:ext uri="{FF2B5EF4-FFF2-40B4-BE49-F238E27FC236}">
+                  <a16:creationId xmlns:a16="http://schemas.microsoft.com/office/drawing/2014/main" id="{A370B553-FE3E-42FE-A905-0D43199229C5}"/>
+                </a:ext>
+              </a:extLst>
+            </p:cNvPr>
+            <p:cNvGrpSpPr/>
+            <p:nvPr/>
+          </p:nvGrpSpPr>
+          <p:grpSpPr>
+            <a:xfrm>
+              <a:off x="1279845" y="4197836"/>
+              <a:ext cx="1107238" cy="1001222"/>
+              <a:chOff x="1279845" y="4197836"/>
+              <a:chExt cx="1107238" cy="1001222"/>
+            </a:xfrm>
+          </p:grpSpPr>
+          <p:sp>
+            <p:nvSpPr>
+              <p:cNvPr id="250" name="Raute 249">
+                <a:extLst>
+                  <a:ext uri="{FF2B5EF4-FFF2-40B4-BE49-F238E27FC236}">
+                    <a16:creationId xmlns:a16="http://schemas.microsoft.com/office/drawing/2014/main" id="{D9413C45-F529-42CE-953E-CAF439CAA7C0}"/>
+                  </a:ext>
+                </a:extLst>
+              </p:cNvPr>
+              <p:cNvSpPr/>
+              <p:nvPr/>
+            </p:nvSpPr>
+            <p:spPr>
+              <a:xfrm>
+                <a:off x="1279845" y="4197836"/>
+                <a:ext cx="1107238" cy="1001222"/>
+              </a:xfrm>
+              <a:prstGeom prst="diamond">
+                <a:avLst/>
+              </a:prstGeom>
+              <a:solidFill>
+                <a:schemeClr val="bg1"/>
+              </a:solidFill>
+              <a:ln>
+                <a:solidFill>
+                  <a:schemeClr val="tx1"/>
+                </a:solidFill>
+              </a:ln>
+            </p:spPr>
+            <p:style>
+              <a:lnRef idx="2">
+                <a:schemeClr val="accent1">
+                  <a:shade val="50000"/>
+                </a:schemeClr>
+              </a:lnRef>
+              <a:fillRef idx="1">
+                <a:schemeClr val="accent1"/>
+              </a:fillRef>
+              <a:effectRef idx="0">
+                <a:schemeClr val="accent1"/>
+              </a:effectRef>
+              <a:fontRef idx="minor">
+                <a:schemeClr val="lt1"/>
+              </a:fontRef>
+            </p:style>
+            <p:txBody>
+              <a:bodyPr rtlCol="0" anchor="ctr"/>
+              <a:lstStyle/>
+              <a:p>
+                <a:pPr algn="ctr"/>
+                <a:endParaRPr lang="de-AT" sz="1400" dirty="0">
+                  <a:solidFill>
+                    <a:schemeClr val="tx1"/>
+                  </a:solidFill>
+                </a:endParaRPr>
+              </a:p>
+            </p:txBody>
+          </p:sp>
+          <p:cxnSp>
+            <p:nvCxnSpPr>
+              <p:cNvPr id="251" name="Gerader Verbinder 250">
+                <a:extLst>
+                  <a:ext uri="{FF2B5EF4-FFF2-40B4-BE49-F238E27FC236}">
+                    <a16:creationId xmlns:a16="http://schemas.microsoft.com/office/drawing/2014/main" id="{CBDE51E5-586D-40E8-9B1F-7A833EE61C5A}"/>
+                  </a:ext>
+                </a:extLst>
+              </p:cNvPr>
+              <p:cNvCxnSpPr>
+                <a:cxnSpLocks/>
+              </p:cNvCxnSpPr>
+              <p:nvPr/>
+            </p:nvCxnSpPr>
+            <p:spPr>
+              <a:xfrm>
+                <a:off x="1542340" y="4453269"/>
+                <a:ext cx="582247" cy="0"/>
+              </a:xfrm>
+              <a:prstGeom prst="line">
+                <a:avLst/>
+              </a:prstGeom>
+              <a:ln>
+                <a:solidFill>
+                  <a:schemeClr val="tx1"/>
+                </a:solidFill>
+              </a:ln>
+            </p:spPr>
+            <p:style>
+              <a:lnRef idx="1">
+                <a:schemeClr val="accent1"/>
+              </a:lnRef>
+              <a:fillRef idx="0">
+                <a:schemeClr val="accent1"/>
+              </a:fillRef>
+              <a:effectRef idx="0">
+                <a:schemeClr val="accent1"/>
+              </a:effectRef>
+              <a:fontRef idx="minor">
+                <a:schemeClr val="tx1"/>
+              </a:fontRef>
+            </p:style>
+          </p:cxnSp>
+        </p:grpSp>
+        <p:sp>
+          <p:nvSpPr>
+            <p:cNvPr id="249" name="Textfeld 248">
+              <a:extLst>
+                <a:ext uri="{FF2B5EF4-FFF2-40B4-BE49-F238E27FC236}">
+                  <a16:creationId xmlns:a16="http://schemas.microsoft.com/office/drawing/2014/main" id="{7E1F5B51-BC78-4536-ADB8-E3400E8FC3EC}"/>
+                </a:ext>
+              </a:extLst>
+            </p:cNvPr>
+            <p:cNvSpPr txBox="1"/>
+            <p:nvPr/>
+          </p:nvSpPr>
+          <p:spPr>
+            <a:xfrm>
+              <a:off x="1205964" y="4399929"/>
+              <a:ext cx="1270129" cy="646331"/>
+            </a:xfrm>
+            <a:prstGeom prst="rect">
+              <a:avLst/>
+            </a:prstGeom>
+            <a:noFill/>
+          </p:spPr>
+          <p:txBody>
+            <a:bodyPr wrap="square" rtlCol="0">
+              <a:spAutoFit/>
+            </a:bodyPr>
+            <a:lstStyle/>
+            <a:p>
+              <a:pPr algn="ctr"/>
+              <a:r>
+                <a:rPr lang="de-AT" sz="1200" dirty="0"/>
+                <a:t>Technical </a:t>
+              </a:r>
+            </a:p>
+            <a:p>
+              <a:pPr algn="ctr"/>
+              <a:r>
+                <a:rPr lang="de-AT" sz="1200" dirty="0" err="1"/>
+                <a:t>Planning</a:t>
+              </a:r>
+              <a:endParaRPr lang="de-AT" sz="1200" dirty="0"/>
+            </a:p>
+            <a:p>
+              <a:pPr algn="ctr"/>
+              <a:r>
+                <a:rPr lang="de-AT" sz="1200" dirty="0" err="1"/>
+                <a:t>finished</a:t>
+              </a:r>
+              <a:endParaRPr lang="de-AT" sz="1200" dirty="0"/>
+            </a:p>
+          </p:txBody>
+        </p:sp>
+      </p:grpSp>
+      <p:sp>
+        <p:nvSpPr>
+          <p:cNvPr id="252" name="Textfeld 251">
+            <a:extLst>
+              <a:ext uri="{FF2B5EF4-FFF2-40B4-BE49-F238E27FC236}">
+                <a16:creationId xmlns:a16="http://schemas.microsoft.com/office/drawing/2014/main" id="{78E54E38-BB9B-4047-9C87-297C17550E46}"/>
+              </a:ext>
+            </a:extLst>
+          </p:cNvPr>
+          <p:cNvSpPr txBox="1"/>
+          <p:nvPr/>
+        </p:nvSpPr>
+        <p:spPr>
+          <a:xfrm>
+            <a:off x="4217435" y="5784389"/>
+            <a:ext cx="604408" cy="307777"/>
+          </a:xfrm>
+          <a:prstGeom prst="rect">
+            <a:avLst/>
+          </a:prstGeom>
+          <a:noFill/>
+        </p:spPr>
+        <p:txBody>
+          <a:bodyPr wrap="square" rtlCol="0">
+            <a:spAutoFit/>
+          </a:bodyPr>
+          <a:lstStyle/>
+          <a:p>
+            <a:r>
+              <a:rPr lang="de-AT" sz="1400" dirty="0"/>
+              <a:t>3.6 </a:t>
+            </a:r>
+          </a:p>
+        </p:txBody>
+      </p:sp>
+      <p:cxnSp>
+        <p:nvCxnSpPr>
+          <p:cNvPr id="253" name="Gerader Verbinder 252">
+            <a:extLst>
+              <a:ext uri="{FF2B5EF4-FFF2-40B4-BE49-F238E27FC236}">
+                <a16:creationId xmlns:a16="http://schemas.microsoft.com/office/drawing/2014/main" id="{F7AE44E5-8633-4CB4-99DD-423F05A4EB0B}"/>
+              </a:ext>
+            </a:extLst>
+          </p:cNvPr>
+          <p:cNvCxnSpPr>
+            <a:cxnSpLocks/>
+            <a:stCxn id="141" idx="2"/>
+            <a:endCxn id="198" idx="0"/>
+          </p:cNvCxnSpPr>
+          <p:nvPr/>
+        </p:nvCxnSpPr>
+        <p:spPr>
+          <a:xfrm>
+            <a:off x="4403248" y="1636143"/>
+            <a:ext cx="4389" cy="260531"/>
+          </a:xfrm>
+          <a:prstGeom prst="line">
+            <a:avLst/>
+          </a:prstGeom>
+          <a:ln>
+            <a:solidFill>
+              <a:schemeClr val="tx1"/>
+            </a:solidFill>
+          </a:ln>
+        </p:spPr>
+        <p:style>
+          <a:lnRef idx="1">
+            <a:schemeClr val="accent1"/>
+          </a:lnRef>
+          <a:fillRef idx="0">
+            <a:schemeClr val="accent1"/>
+          </a:fillRef>
+          <a:effectRef idx="0">
+            <a:schemeClr val="accent1"/>
+          </a:effectRef>
+          <a:fontRef idx="minor">
+            <a:schemeClr val="tx1"/>
+          </a:fontRef>
+        </p:style>
+      </p:cxnSp>
     </p:spTree>
     <p:extLst>
       <p:ext uri="{BB962C8B-B14F-4D97-AF65-F5344CB8AC3E}">

</xml_diff>